<commit_message>
Module 3 edits. Lessons 1,2,9,11(new). renamed 11, 12, 13
</commit_message>
<xml_diff>
--- a/Complimentary Course Content/Module3/Lessons/Module3_Lesson02 Understanding Xamarin.pptx
+++ b/Complimentary Course Content/Module3/Lessons/Module3_Lesson02 Understanding Xamarin.pptx
@@ -5,7 +5,7 @@
     <p:sldMasterId id="2147483648" r:id="rId1"/>
   </p:sldMasterIdLst>
   <p:notesMasterIdLst>
-    <p:notesMasterId r:id="rId26"/>
+    <p:notesMasterId r:id="rId27"/>
   </p:notesMasterIdLst>
   <p:sldIdLst>
     <p:sldId id="256" r:id="rId2"/>
@@ -28,10 +28,11 @@
     <p:sldId id="323" r:id="rId19"/>
     <p:sldId id="311" r:id="rId20"/>
     <p:sldId id="322" r:id="rId21"/>
-    <p:sldId id="317" r:id="rId22"/>
-    <p:sldId id="312" r:id="rId23"/>
-    <p:sldId id="308" r:id="rId24"/>
-    <p:sldId id="314" r:id="rId25"/>
+    <p:sldId id="327" r:id="rId22"/>
+    <p:sldId id="317" r:id="rId23"/>
+    <p:sldId id="312" r:id="rId24"/>
+    <p:sldId id="308" r:id="rId25"/>
+    <p:sldId id="314" r:id="rId26"/>
   </p:sldIdLst>
   <p:sldSz cx="12192000" cy="6858000"/>
   <p:notesSz cx="6858000" cy="9144000"/>
@@ -243,7 +244,7 @@
             <a:fld id="{49B60EF2-7028-489F-85D8-FE86CD7CF2A0}" type="datetimeFigureOut">
               <a:rPr lang="en-US" smtClean="0"/>
               <a:pPr/>
-              <a:t>9/9/16</a:t>
+              <a:t>11/1/16</a:t>
             </a:fld>
             <a:endParaRPr lang="en-US"/>
           </a:p>
@@ -556,7 +557,7 @@
           <a:lstStyle/>
           <a:p>
             <a:r>
-              <a:rPr lang="en-US" sz="1200" b="0" i="0" kern="1200" dirty="0" smtClean="0">
+              <a:rPr lang="en-US" sz="1200" b="0" i="0" kern="1200" dirty="0">
                 <a:solidFill>
                   <a:schemeClr val="tx1"/>
                 </a:solidFill>
@@ -568,7 +569,7 @@
               <a:t>Images and excerpts from </a:t>
             </a:r>
             <a:r>
-              <a:rPr lang="en-US" sz="1200" b="0" i="1" kern="1200" dirty="0" err="1" smtClean="0">
+              <a:rPr lang="en-US" sz="1200" b="0" i="1" kern="1200" dirty="0">
                 <a:solidFill>
                   <a:schemeClr val="tx1"/>
                 </a:solidFill>
@@ -577,10 +578,10 @@
                 <a:ea typeface="+mn-ea"/>
                 <a:cs typeface="+mn-cs"/>
               </a:rPr>
-              <a:t>Xamarin</a:t>
-            </a:r>
-            <a:r>
-              <a:rPr lang="en-US" sz="1200" b="0" i="1" kern="1200" dirty="0" smtClean="0">
+              <a:t>Xamarin Mobile Application Development </a:t>
+            </a:r>
+            <a:r>
+              <a:rPr lang="en-US" sz="1200" b="0" i="0" kern="1200" dirty="0">
                 <a:solidFill>
                   <a:schemeClr val="tx1"/>
                 </a:solidFill>
@@ -589,48 +590,12 @@
                 <a:ea typeface="+mn-ea"/>
                 <a:cs typeface="+mn-cs"/>
               </a:rPr>
-              <a:t> Mobile Application Development </a:t>
-            </a:r>
-            <a:r>
-              <a:rPr lang="en-US" sz="1200" b="0" i="0" kern="1200" dirty="0" smtClean="0">
-                <a:solidFill>
-                  <a:schemeClr val="tx1"/>
-                </a:solidFill>
-                <a:effectLst/>
-                <a:latin typeface="+mn-lt"/>
-                <a:ea typeface="+mn-ea"/>
-                <a:cs typeface="+mn-cs"/>
-              </a:rPr>
-              <a:t>by Dan Hermes, published by </a:t>
-            </a:r>
-            <a:r>
-              <a:rPr lang="en-US" sz="1200" b="0" i="0" kern="1200" dirty="0" err="1" smtClean="0">
-                <a:solidFill>
-                  <a:schemeClr val="tx1"/>
-                </a:solidFill>
-                <a:effectLst/>
-                <a:latin typeface="+mn-lt"/>
-                <a:ea typeface="+mn-ea"/>
-                <a:cs typeface="+mn-cs"/>
-              </a:rPr>
-              <a:t>Apress</a:t>
-            </a:r>
-            <a:r>
-              <a:rPr lang="en-US" sz="1200" b="0" i="0" kern="1200" dirty="0" smtClean="0">
-                <a:solidFill>
-                  <a:schemeClr val="tx1"/>
-                </a:solidFill>
-                <a:effectLst/>
-                <a:latin typeface="+mn-lt"/>
-                <a:ea typeface="+mn-ea"/>
-                <a:cs typeface="+mn-cs"/>
-              </a:rPr>
-              <a:t>  </a:t>
-            </a:r>
-          </a:p>
-          <a:p>
-            <a:r>
-              <a:rPr lang="en-US" sz="1200" b="0" i="0" kern="1200" dirty="0" smtClean="0">
+              <a:t>by Dan Hermes, published by Apress  </a:t>
+            </a:r>
+          </a:p>
+          <a:p>
+            <a:r>
+              <a:rPr lang="en-US" sz="1200" b="0" i="0" kern="1200" dirty="0">
                 <a:solidFill>
                   <a:schemeClr val="tx1"/>
                 </a:solidFill>
@@ -640,22 +605,9 @@
                 <a:cs typeface="+mn-cs"/>
                 <a:hlinkClick r:id="rId3"/>
               </a:rPr>
-              <a:t>http://www.mobilecsharpcafe.com/xamarin</a:t>
-            </a:r>
-            <a:r>
-              <a:rPr lang="en-US" sz="1200" b="0" i="0" kern="1200" smtClean="0">
-                <a:solidFill>
-                  <a:schemeClr val="tx1"/>
-                </a:solidFill>
-                <a:effectLst/>
-                <a:latin typeface="+mn-lt"/>
-                <a:ea typeface="+mn-ea"/>
-                <a:cs typeface="+mn-cs"/>
-                <a:hlinkClick r:id="rId3"/>
-              </a:rPr>
-              <a:t>-book/</a:t>
-            </a:r>
-            <a:endParaRPr lang="en-US" sz="1200" b="0" i="0" kern="1200" smtClean="0">
+              <a:t>http://www.mobilecsharpcafe.com/xamarin-book/</a:t>
+            </a:r>
+            <a:endParaRPr lang="en-US" sz="1200" b="0" i="0" kern="1200" dirty="0">
               <a:solidFill>
                 <a:schemeClr val="tx1"/>
               </a:solidFill>
@@ -1028,7 +980,7 @@
               <a:defRPr/>
             </a:pPr>
             <a:r>
-              <a:rPr lang="en-US" b="1" smtClean="0"/>
+              <a:rPr lang="en-US" b="1"/>
               <a:t>References:</a:t>
             </a:r>
           </a:p>
@@ -1051,12 +1003,8 @@
               <a:defRPr/>
             </a:pPr>
             <a:r>
-              <a:rPr lang="en-US" dirty="0" smtClean="0"/>
-              <a:t>https</a:t>
-            </a:r>
-            <a:r>
               <a:rPr lang="en-US" dirty="0"/>
-              <a:t>://developer.xamarin.com/guides/cross-platform/fsharp/</a:t>
+              <a:t>https://developer.xamarin.com/guides/cross-platform/fsharp/</a:t>
             </a:r>
           </a:p>
           <a:p>
@@ -1342,7 +1290,7 @@
           </a:ln>
           <a:extLst>
             <a:ext uri="{909E8E84-426E-40dd-AFC4-6F175D3DCCD1}">
-              <a14:hiddenFill xmlns:a14="http://schemas.microsoft.com/office/drawing/2010/main" xmlns="">
+              <a14:hiddenFill xmlns="" xmlns:a14="http://schemas.microsoft.com/office/drawing/2010/main">
                 <a:solidFill>
                   <a:srgbClr val="FFFFFF"/>
                 </a:solidFill>
@@ -1365,14 +1313,14 @@
           <a:noFill/>
           <a:extLst>
             <a:ext uri="{909E8E84-426E-40dd-AFC4-6F175D3DCCD1}">
-              <a14:hiddenFill xmlns:a14="http://schemas.microsoft.com/office/drawing/2010/main" xmlns="">
+              <a14:hiddenFill xmlns="" xmlns:a14="http://schemas.microsoft.com/office/drawing/2010/main">
                 <a:solidFill>
                   <a:srgbClr val="FFFFFF"/>
                 </a:solidFill>
               </a14:hiddenFill>
             </a:ext>
             <a:ext uri="{91240B29-F687-4f45-9708-019B960494DF}">
-              <a14:hiddenLine xmlns:a14="http://schemas.microsoft.com/office/drawing/2010/main" xmlns="" w="9525">
+              <a14:hiddenLine xmlns="" xmlns:a14="http://schemas.microsoft.com/office/drawing/2010/main" w="9525">
                 <a:solidFill>
                   <a:srgbClr val="000000"/>
                 </a:solidFill>
@@ -1431,14 +1379,14 @@
           <a:noFill/>
           <a:extLst>
             <a:ext uri="{909E8E84-426E-40dd-AFC4-6F175D3DCCD1}">
-              <a14:hiddenFill xmlns:a14="http://schemas.microsoft.com/office/drawing/2010/main" xmlns="">
+              <a14:hiddenFill xmlns="" xmlns:a14="http://schemas.microsoft.com/office/drawing/2010/main">
                 <a:solidFill>
                   <a:srgbClr val="FFFFFF"/>
                 </a:solidFill>
               </a14:hiddenFill>
             </a:ext>
             <a:ext uri="{91240B29-F687-4f45-9708-019B960494DF}">
-              <a14:hiddenLine xmlns:a14="http://schemas.microsoft.com/office/drawing/2010/main" xmlns="" w="9525">
+              <a14:hiddenLine xmlns="" xmlns:a14="http://schemas.microsoft.com/office/drawing/2010/main" w="9525">
                 <a:solidFill>
                   <a:srgbClr val="000000"/>
                 </a:solidFill>
@@ -1611,7 +1559,7 @@
           </a:ln>
           <a:extLst>
             <a:ext uri="{909E8E84-426E-40dd-AFC4-6F175D3DCCD1}">
-              <a14:hiddenFill xmlns:a14="http://schemas.microsoft.com/office/drawing/2010/main" xmlns="">
+              <a14:hiddenFill xmlns="" xmlns:a14="http://schemas.microsoft.com/office/drawing/2010/main">
                 <a:solidFill>
                   <a:srgbClr val="FFFFFF"/>
                 </a:solidFill>
@@ -1634,14 +1582,14 @@
           <a:noFill/>
           <a:extLst>
             <a:ext uri="{909E8E84-426E-40dd-AFC4-6F175D3DCCD1}">
-              <a14:hiddenFill xmlns:a14="http://schemas.microsoft.com/office/drawing/2010/main" xmlns="">
+              <a14:hiddenFill xmlns="" xmlns:a14="http://schemas.microsoft.com/office/drawing/2010/main">
                 <a:solidFill>
                   <a:srgbClr val="FFFFFF"/>
                 </a:solidFill>
               </a14:hiddenFill>
             </a:ext>
             <a:ext uri="{91240B29-F687-4f45-9708-019B960494DF}">
-              <a14:hiddenLine xmlns:a14="http://schemas.microsoft.com/office/drawing/2010/main" xmlns="" w="9525">
+              <a14:hiddenLine xmlns="" xmlns:a14="http://schemas.microsoft.com/office/drawing/2010/main" w="9525">
                 <a:solidFill>
                   <a:srgbClr val="000000"/>
                 </a:solidFill>
@@ -1678,14 +1626,14 @@
           <a:noFill/>
           <a:extLst>
             <a:ext uri="{909E8E84-426E-40dd-AFC4-6F175D3DCCD1}">
-              <a14:hiddenFill xmlns:a14="http://schemas.microsoft.com/office/drawing/2010/main" xmlns="">
+              <a14:hiddenFill xmlns="" xmlns:a14="http://schemas.microsoft.com/office/drawing/2010/main">
                 <a:solidFill>
                   <a:srgbClr val="FFFFFF"/>
                 </a:solidFill>
               </a14:hiddenFill>
             </a:ext>
             <a:ext uri="{91240B29-F687-4f45-9708-019B960494DF}">
-              <a14:hiddenLine xmlns:a14="http://schemas.microsoft.com/office/drawing/2010/main" xmlns="" w="9525">
+              <a14:hiddenLine xmlns="" xmlns:a14="http://schemas.microsoft.com/office/drawing/2010/main" w="9525">
                 <a:solidFill>
                   <a:srgbClr val="000000"/>
                 </a:solidFill>
@@ -1858,7 +1806,7 @@
           </a:ln>
           <a:extLst>
             <a:ext uri="{909E8E84-426E-40dd-AFC4-6F175D3DCCD1}">
-              <a14:hiddenFill xmlns:a14="http://schemas.microsoft.com/office/drawing/2010/main" xmlns="">
+              <a14:hiddenFill xmlns="" xmlns:a14="http://schemas.microsoft.com/office/drawing/2010/main">
                 <a:solidFill>
                   <a:srgbClr val="FFFFFF"/>
                 </a:solidFill>
@@ -1881,14 +1829,14 @@
           <a:noFill/>
           <a:extLst>
             <a:ext uri="{909E8E84-426E-40dd-AFC4-6F175D3DCCD1}">
-              <a14:hiddenFill xmlns:a14="http://schemas.microsoft.com/office/drawing/2010/main" xmlns="">
+              <a14:hiddenFill xmlns="" xmlns:a14="http://schemas.microsoft.com/office/drawing/2010/main">
                 <a:solidFill>
                   <a:srgbClr val="FFFFFF"/>
                 </a:solidFill>
               </a14:hiddenFill>
             </a:ext>
             <a:ext uri="{91240B29-F687-4f45-9708-019B960494DF}">
-              <a14:hiddenLine xmlns:a14="http://schemas.microsoft.com/office/drawing/2010/main" xmlns="" w="9525">
+              <a14:hiddenLine xmlns="" xmlns:a14="http://schemas.microsoft.com/office/drawing/2010/main" w="9525">
                 <a:solidFill>
                   <a:srgbClr val="000000"/>
                 </a:solidFill>
@@ -1925,14 +1873,14 @@
           <a:noFill/>
           <a:extLst>
             <a:ext uri="{909E8E84-426E-40dd-AFC4-6F175D3DCCD1}">
-              <a14:hiddenFill xmlns:a14="http://schemas.microsoft.com/office/drawing/2010/main" xmlns="">
+              <a14:hiddenFill xmlns="" xmlns:a14="http://schemas.microsoft.com/office/drawing/2010/main">
                 <a:solidFill>
                   <a:srgbClr val="FFFFFF"/>
                 </a:solidFill>
               </a14:hiddenFill>
             </a:ext>
             <a:ext uri="{91240B29-F687-4f45-9708-019B960494DF}">
-              <a14:hiddenLine xmlns:a14="http://schemas.microsoft.com/office/drawing/2010/main" xmlns="" w="9525">
+              <a14:hiddenLine xmlns="" xmlns:a14="http://schemas.microsoft.com/office/drawing/2010/main" w="9525">
                 <a:solidFill>
                   <a:srgbClr val="000000"/>
                 </a:solidFill>
@@ -2115,7 +2063,7 @@
               <a:buNone/>
             </a:pPr>
             <a:r>
-              <a:rPr lang="en-US" b="1" dirty="0" smtClean="0"/>
+              <a:rPr lang="en-US" b="1" dirty="0"/>
               <a:t>Notes:</a:t>
             </a:r>
           </a:p>
@@ -2125,16 +2073,12 @@
               <a:buChar char="•"/>
             </a:pPr>
             <a:r>
-              <a:rPr lang="en-US" dirty="0" err="1" smtClean="0"/>
+              <a:rPr lang="en-US" dirty="0" err="1"/>
               <a:t>Xamarin</a:t>
             </a:r>
             <a:r>
-              <a:rPr lang="en-US" dirty="0" smtClean="0"/>
-              <a:t> </a:t>
-            </a:r>
-            <a:r>
               <a:rPr lang="en-US" dirty="0"/>
-              <a:t>is free with all versions of Visual Studio, even the free</a:t>
+              <a:t> is free with all versions of Visual Studio, even the free</a:t>
             </a:r>
             <a:r>
               <a:rPr lang="en-US" baseline="0" dirty="0"/>
@@ -2161,7 +2105,7 @@
               <a:buFont typeface="Arial"/>
               <a:buChar char="•"/>
             </a:pPr>
-            <a:endParaRPr lang="en-US" baseline="0" dirty="0" smtClean="0"/>
+            <a:endParaRPr lang="en-US" baseline="0" dirty="0"/>
           </a:p>
           <a:p>
             <a:pPr marL="0" indent="0">
@@ -2169,10 +2113,9 @@
               <a:buNone/>
             </a:pPr>
             <a:r>
-              <a:rPr lang="en-US" b="1" baseline="0" dirty="0" smtClean="0"/>
+              <a:rPr lang="en-US" b="1" baseline="0" dirty="0"/>
               <a:t>References:</a:t>
             </a:r>
-            <a:endParaRPr lang="en-US" b="1" baseline="0" dirty="0"/>
           </a:p>
           <a:p>
             <a:pPr marL="171450" indent="-171450">
@@ -2276,7 +2219,7 @@
           <a:lstStyle/>
           <a:p>
             <a:r>
-              <a:rPr lang="en-US" b="1" dirty="0" smtClean="0"/>
+              <a:rPr lang="en-US" b="1" dirty="0"/>
               <a:t>Notes:</a:t>
             </a:r>
           </a:p>
@@ -2286,15 +2229,15 @@
               <a:buChar char="•"/>
             </a:pPr>
             <a:r>
-              <a:rPr lang="en-US" b="0" dirty="0" err="1" smtClean="0"/>
+              <a:rPr lang="en-US" b="0" dirty="0" err="1"/>
               <a:t>Xamarin</a:t>
             </a:r>
             <a:r>
-              <a:rPr lang="en-US" b="0" dirty="0" smtClean="0"/>
+              <a:rPr lang="en-US" b="0" dirty="0"/>
               <a:t> Studio is available for</a:t>
             </a:r>
             <a:r>
-              <a:rPr lang="en-US" b="0" baseline="0" dirty="0" smtClean="0"/>
+              <a:rPr lang="en-US" b="0" baseline="0" dirty="0"/>
               <a:t> both Mac and PC</a:t>
             </a:r>
           </a:p>
@@ -2304,10 +2247,9 @@
               <a:buChar char="•"/>
             </a:pPr>
             <a:r>
-              <a:rPr lang="en-US" b="0" dirty="0" smtClean="0"/>
+              <a:rPr lang="en-US" b="0" dirty="0"/>
               <a:t>Pictured here on a Mac</a:t>
             </a:r>
-            <a:endParaRPr lang="en-US" b="0" dirty="0"/>
           </a:p>
         </p:txBody>
       </p:sp>
@@ -2766,71 +2708,92 @@
           <a:bodyPr/>
           <a:lstStyle/>
           <a:p>
-            <a:pPr marL="0" indent="0">
-              <a:buFont typeface="Arial"/>
+            <a:pPr marL="0" marR="0" lvl="0" indent="0" algn="l" defTabSz="914400" rtl="0" eaLnBrk="1" fontAlgn="auto" latinLnBrk="0" hangingPunct="1">
+              <a:lnSpc>
+                <a:spcPct val="100000"/>
+              </a:lnSpc>
+              <a:spcBef>
+                <a:spcPts val="0"/>
+              </a:spcBef>
+              <a:spcAft>
+                <a:spcPts val="0"/>
+              </a:spcAft>
+              <a:buClrTx/>
+              <a:buSzTx/>
+              <a:buFont typeface="Arial" panose="020B0604020202020204" pitchFamily="34" charset="0"/>
               <a:buNone/>
+              <a:tabLst/>
+              <a:defRPr/>
             </a:pPr>
             <a:r>
-              <a:rPr lang="en-US" sz="1200" b="1" i="0" u="none" strike="noStrike" kern="1200" baseline="0" dirty="0" smtClean="0">
-                <a:solidFill>
-                  <a:schemeClr val="tx1"/>
-                </a:solidFill>
-                <a:latin typeface="+mn-lt"/>
-                <a:ea typeface="+mn-ea"/>
-                <a:cs typeface="+mn-cs"/>
-              </a:rPr>
-              <a:t>References:</a:t>
-            </a:r>
-          </a:p>
-          <a:p>
-            <a:pPr marL="171450" indent="-171450">
-              <a:buFont typeface="Arial"/>
+              <a:rPr lang="en-US" b="1" dirty="0"/>
+              <a:t>Notes:</a:t>
+            </a:r>
+          </a:p>
+          <a:p>
+            <a:pPr marL="171450" marR="0" lvl="0" indent="-171450" algn="l" defTabSz="914400" rtl="0" eaLnBrk="1" fontAlgn="auto" latinLnBrk="0" hangingPunct="1">
+              <a:lnSpc>
+                <a:spcPct val="100000"/>
+              </a:lnSpc>
+              <a:spcBef>
+                <a:spcPts val="0"/>
+              </a:spcBef>
+              <a:spcAft>
+                <a:spcPts val="0"/>
+              </a:spcAft>
+              <a:buClrTx/>
+              <a:buSzTx/>
+              <a:buFont typeface="Arial" panose="020B0604020202020204" pitchFamily="34" charset="0"/>
               <a:buChar char="•"/>
+              <a:tabLst/>
+              <a:defRPr/>
             </a:pPr>
             <a:r>
-              <a:rPr lang="en-US" sz="1200" b="0" i="0" u="none" strike="noStrike" kern="1200" baseline="0" dirty="0" smtClean="0">
-                <a:solidFill>
-                  <a:schemeClr val="tx1"/>
-                </a:solidFill>
-                <a:latin typeface="+mn-lt"/>
-                <a:ea typeface="+mn-ea"/>
-                <a:cs typeface="+mn-cs"/>
-              </a:rPr>
-              <a:t>Image reinterpreted from </a:t>
-            </a:r>
-            <a:r>
-              <a:rPr lang="en-US" sz="1200" b="0" i="0" u="none" strike="noStrike" kern="1200" baseline="0" dirty="0" err="1" smtClean="0">
-                <a:solidFill>
-                  <a:schemeClr val="tx1"/>
-                </a:solidFill>
-                <a:latin typeface="+mn-lt"/>
-                <a:ea typeface="+mn-ea"/>
-                <a:cs typeface="+mn-cs"/>
-              </a:rPr>
-              <a:t>Xamarin</a:t>
-            </a:r>
-            <a:r>
-              <a:rPr lang="en-US" sz="1200" b="0" i="0" u="none" strike="noStrike" kern="1200" baseline="0" dirty="0" smtClean="0">
-                <a:solidFill>
-                  <a:schemeClr val="tx1"/>
-                </a:solidFill>
-                <a:latin typeface="+mn-lt"/>
-                <a:ea typeface="+mn-ea"/>
-                <a:cs typeface="+mn-cs"/>
-              </a:rPr>
-              <a:t> </a:t>
-            </a:r>
-            <a:r>
-              <a:rPr lang="en-US" sz="1200" b="0" i="0" u="none" strike="noStrike" kern="1200" baseline="0" dirty="0">
-                <a:solidFill>
-                  <a:schemeClr val="tx1"/>
-                </a:solidFill>
-                <a:latin typeface="+mn-lt"/>
-                <a:ea typeface="+mn-ea"/>
-                <a:cs typeface="+mn-cs"/>
-              </a:rPr>
-              <a:t>Mobile Application Development by Dan Hermes  http://amzn.to/1rowG7K</a:t>
-            </a:r>
+              <a:rPr lang="en-US" baseline="0" dirty="0"/>
+              <a:t>Xamarin.Forms with UWP gives us the Windows 10 phones and desktops</a:t>
+            </a:r>
+          </a:p>
+          <a:p>
+            <a:pPr marL="171450" marR="0" lvl="0" indent="-171450" algn="l" defTabSz="914400" rtl="0" eaLnBrk="1" fontAlgn="auto" latinLnBrk="0" hangingPunct="1">
+              <a:lnSpc>
+                <a:spcPct val="100000"/>
+              </a:lnSpc>
+              <a:spcBef>
+                <a:spcPts val="0"/>
+              </a:spcBef>
+              <a:spcAft>
+                <a:spcPts val="0"/>
+              </a:spcAft>
+              <a:buClrTx/>
+              <a:buSzTx/>
+              <a:buFont typeface="Arial" panose="020B0604020202020204" pitchFamily="34" charset="0"/>
+              <a:buChar char="•"/>
+              <a:tabLst/>
+              <a:defRPr/>
+            </a:pPr>
+            <a:r>
+              <a:rPr lang="en-US" baseline="0" dirty="0"/>
+              <a:t>Windows 8 and 8.1 phones still work with Xamarin.Forms but require a Windows 8 Phone project type (not a UWP project).</a:t>
+            </a:r>
+          </a:p>
+          <a:p>
+            <a:pPr marL="171450" marR="0" lvl="0" indent="-171450" algn="l" defTabSz="914400" rtl="0" eaLnBrk="1" fontAlgn="auto" latinLnBrk="0" hangingPunct="1">
+              <a:lnSpc>
+                <a:spcPct val="100000"/>
+              </a:lnSpc>
+              <a:spcBef>
+                <a:spcPts val="0"/>
+              </a:spcBef>
+              <a:spcAft>
+                <a:spcPts val="0"/>
+              </a:spcAft>
+              <a:buClrTx/>
+              <a:buSzTx/>
+              <a:buFont typeface="Arial" panose="020B0604020202020204" pitchFamily="34" charset="0"/>
+              <a:buChar char="•"/>
+              <a:tabLst/>
+              <a:defRPr/>
+            </a:pPr>
             <a:endParaRPr lang="en-US" dirty="0"/>
           </a:p>
         </p:txBody>
@@ -2852,7 +2815,6 @@
           <a:p>
             <a:fld id="{01283FAC-A721-45A3-BBDE-EAF2B09B7CD9}" type="slidenum">
               <a:rPr lang="en-US" smtClean="0"/>
-              <a:pPr/>
               <a:t>21</a:t>
             </a:fld>
             <a:endParaRPr lang="en-US"/>
@@ -2862,7 +2824,7 @@
     </p:spTree>
     <p:extLst>
       <p:ext uri="{BB962C8B-B14F-4D97-AF65-F5344CB8AC3E}">
-        <p14:creationId xmlns:p14="http://schemas.microsoft.com/office/powerpoint/2010/main" val="1601551782"/>
+        <p14:creationId xmlns:p14="http://schemas.microsoft.com/office/powerpoint/2010/main" val="4219189857"/>
       </p:ext>
     </p:extLst>
   </p:cSld>
@@ -2916,127 +2878,61 @@
           <a:bodyPr/>
           <a:lstStyle/>
           <a:p>
-            <a:pPr marL="0" marR="0" lvl="0" indent="0" algn="l" defTabSz="914400" rtl="0" eaLnBrk="1" fontAlgn="auto" latinLnBrk="0" hangingPunct="1">
-              <a:lnSpc>
-                <a:spcPct val="100000"/>
-              </a:lnSpc>
-              <a:spcBef>
-                <a:spcPts val="0"/>
-              </a:spcBef>
-              <a:spcAft>
-                <a:spcPts val="0"/>
-              </a:spcAft>
-              <a:buClrTx/>
-              <a:buSzTx/>
-              <a:buFontTx/>
+            <a:pPr marL="0" indent="0">
+              <a:buFont typeface="Arial"/>
               <a:buNone/>
-              <a:tabLst/>
-              <a:defRPr/>
             </a:pPr>
             <a:r>
-              <a:rPr lang="en-US" b="1" baseline="0" dirty="0"/>
-              <a:t>Notes:</a:t>
-            </a:r>
-          </a:p>
-          <a:p>
-            <a:pPr marL="171450" marR="0" lvl="0" indent="-171450" algn="l" defTabSz="914400" rtl="0" eaLnBrk="1" fontAlgn="auto" latinLnBrk="0" hangingPunct="1">
-              <a:lnSpc>
-                <a:spcPct val="100000"/>
-              </a:lnSpc>
-              <a:spcBef>
-                <a:spcPts val="0"/>
-              </a:spcBef>
-              <a:spcAft>
-                <a:spcPts val="0"/>
-              </a:spcAft>
-              <a:buClrTx/>
-              <a:buSzTx/>
+              <a:rPr lang="en-US" sz="1200" b="1" i="0" u="none" strike="noStrike" kern="1200" baseline="0" dirty="0">
+                <a:solidFill>
+                  <a:schemeClr val="tx1"/>
+                </a:solidFill>
+                <a:latin typeface="+mn-lt"/>
+                <a:ea typeface="+mn-ea"/>
+                <a:cs typeface="+mn-cs"/>
+              </a:rPr>
+              <a:t>References:</a:t>
+            </a:r>
+          </a:p>
+          <a:p>
+            <a:pPr marL="171450" indent="-171450">
               <a:buFont typeface="Arial"/>
               <a:buChar char="•"/>
-              <a:tabLst/>
-              <a:defRPr/>
             </a:pPr>
             <a:r>
-              <a:rPr lang="en-US" b="0" baseline="0" dirty="0"/>
-              <a:t>Maximize Code Reuse whenever possible.</a:t>
-            </a:r>
-          </a:p>
-          <a:p>
-            <a:pPr marL="171450" marR="0" lvl="0" indent="-171450" algn="l" defTabSz="914400" rtl="0" eaLnBrk="1" fontAlgn="auto" latinLnBrk="0" hangingPunct="1">
-              <a:lnSpc>
-                <a:spcPct val="100000"/>
-              </a:lnSpc>
-              <a:spcBef>
-                <a:spcPts val="0"/>
-              </a:spcBef>
-              <a:spcAft>
-                <a:spcPts val="0"/>
-              </a:spcAft>
-              <a:buClrTx/>
-              <a:buSzTx/>
-              <a:buFont typeface="Arial"/>
-              <a:buChar char="•"/>
-              <a:tabLst/>
-              <a:defRPr/>
-            </a:pPr>
-            <a:r>
-              <a:rPr lang="en-US" baseline="0" dirty="0"/>
-              <a:t>Encapsulation: Exposing a minimal interface of an object to describe interaction points while    hiding implementation details.</a:t>
-            </a:r>
-          </a:p>
-          <a:p>
-            <a:pPr marL="171450" marR="0" lvl="0" indent="-171450" algn="l" defTabSz="914400" rtl="0" eaLnBrk="1" fontAlgn="auto" latinLnBrk="0" hangingPunct="1">
-              <a:lnSpc>
-                <a:spcPct val="100000"/>
-              </a:lnSpc>
-              <a:spcBef>
-                <a:spcPts val="0"/>
-              </a:spcBef>
-              <a:spcAft>
-                <a:spcPts val="0"/>
-              </a:spcAft>
-              <a:buClrTx/>
-              <a:buSzTx/>
-              <a:buFont typeface="Arial"/>
-              <a:buChar char="•"/>
-              <a:tabLst/>
-              <a:defRPr/>
-            </a:pPr>
-            <a:r>
-              <a:rPr lang="en-US" baseline="0" dirty="0"/>
-              <a:t>Separation of concerns (</a:t>
-            </a:r>
-            <a:r>
-              <a:rPr lang="en-US" baseline="0" dirty="0" err="1"/>
-              <a:t>SoC</a:t>
-            </a:r>
-            <a:r>
-              <a:rPr lang="en-US" baseline="0" dirty="0"/>
-              <a:t>): A design principle that involves separating code based on concerns. </a:t>
-            </a:r>
-          </a:p>
-          <a:p>
-            <a:pPr marL="457200" marR="0" lvl="1" indent="0" algn="l" defTabSz="914400" rtl="0" eaLnBrk="1" fontAlgn="auto" latinLnBrk="0" hangingPunct="1">
-              <a:lnSpc>
-                <a:spcPct val="100000"/>
-              </a:lnSpc>
-              <a:spcBef>
-                <a:spcPts val="0"/>
-              </a:spcBef>
-              <a:spcAft>
-                <a:spcPts val="0"/>
-              </a:spcAft>
-              <a:buClrTx/>
-              <a:buSzTx/>
-              <a:buFont typeface="Arial" pitchFamily="34" charset="0"/>
-              <a:buChar char="•"/>
-              <a:tabLst/>
-              <a:defRPr/>
-            </a:pPr>
-            <a:r>
-              <a:rPr lang="en-US" baseline="0" dirty="0"/>
-              <a:t> Concerns could be something as generic as user interface or data access, or as specific as different kinds of similar objects.</a:t>
-            </a:r>
+              <a:rPr lang="en-US" sz="1200" b="0" i="0" u="none" strike="noStrike" kern="1200" baseline="0" dirty="0">
+                <a:solidFill>
+                  <a:schemeClr val="tx1"/>
+                </a:solidFill>
+                <a:latin typeface="+mn-lt"/>
+                <a:ea typeface="+mn-ea"/>
+                <a:cs typeface="+mn-cs"/>
+              </a:rPr>
+              <a:t>Image reinterpreted from </a:t>
+            </a:r>
+            <a:r>
+              <a:rPr lang="en-US" sz="1200" b="0" i="0" u="none" strike="noStrike" kern="1200" baseline="0" dirty="0" err="1">
+                <a:solidFill>
+                  <a:schemeClr val="tx1"/>
+                </a:solidFill>
+                <a:latin typeface="+mn-lt"/>
+                <a:ea typeface="+mn-ea"/>
+                <a:cs typeface="+mn-cs"/>
+              </a:rPr>
+              <a:t>Xamarin</a:t>
+            </a:r>
+            <a:r>
+              <a:rPr lang="en-US" sz="1200" b="0" i="0" u="none" strike="noStrike" kern="1200" baseline="0" dirty="0">
+                <a:solidFill>
+                  <a:schemeClr val="tx1"/>
+                </a:solidFill>
+                <a:latin typeface="+mn-lt"/>
+                <a:ea typeface="+mn-ea"/>
+                <a:cs typeface="+mn-cs"/>
+              </a:rPr>
+              <a:t> Mobile Application Development by Dan Hermes  http://amzn.to/1rowG7K</a:t>
+            </a:r>
+            <a:endParaRPr lang="en-US" dirty="0"/>
           </a:p>
         </p:txBody>
       </p:sp>
@@ -3057,6 +2953,7 @@
           <a:p>
             <a:fld id="{01283FAC-A721-45A3-BBDE-EAF2B09B7CD9}" type="slidenum">
               <a:rPr lang="en-US" smtClean="0"/>
+              <a:pPr/>
               <a:t>22</a:t>
             </a:fld>
             <a:endParaRPr lang="en-US"/>
@@ -3066,7 +2963,7 @@
     </p:spTree>
     <p:extLst>
       <p:ext uri="{BB962C8B-B14F-4D97-AF65-F5344CB8AC3E}">
-        <p14:creationId xmlns:p14="http://schemas.microsoft.com/office/powerpoint/2010/main" val="441908279"/>
+        <p14:creationId xmlns:p14="http://schemas.microsoft.com/office/powerpoint/2010/main" val="1601551782"/>
       </p:ext>
     </p:extLst>
   </p:cSld>
@@ -3143,7 +3040,84 @@
             </a:r>
           </a:p>
           <a:p>
-            <a:pPr marL="0" marR="0" lvl="0" indent="0" algn="l" defTabSz="914400" rtl="0" eaLnBrk="1" fontAlgn="auto" latinLnBrk="0" hangingPunct="1">
+            <a:pPr marL="171450" marR="0" lvl="0" indent="-171450" algn="l" defTabSz="914400" rtl="0" eaLnBrk="1" fontAlgn="auto" latinLnBrk="0" hangingPunct="1">
+              <a:lnSpc>
+                <a:spcPct val="100000"/>
+              </a:lnSpc>
+              <a:spcBef>
+                <a:spcPts val="0"/>
+              </a:spcBef>
+              <a:spcAft>
+                <a:spcPts val="0"/>
+              </a:spcAft>
+              <a:buClrTx/>
+              <a:buSzTx/>
+              <a:buFont typeface="Arial"/>
+              <a:buChar char="•"/>
+              <a:tabLst/>
+              <a:defRPr/>
+            </a:pPr>
+            <a:r>
+              <a:rPr lang="en-US" b="0" baseline="0" dirty="0"/>
+              <a:t>Maximize Code Reuse whenever possible.</a:t>
+            </a:r>
+          </a:p>
+          <a:p>
+            <a:pPr marL="171450" marR="0" lvl="0" indent="-171450" algn="l" defTabSz="914400" rtl="0" eaLnBrk="1" fontAlgn="auto" latinLnBrk="0" hangingPunct="1">
+              <a:lnSpc>
+                <a:spcPct val="100000"/>
+              </a:lnSpc>
+              <a:spcBef>
+                <a:spcPts val="0"/>
+              </a:spcBef>
+              <a:spcAft>
+                <a:spcPts val="0"/>
+              </a:spcAft>
+              <a:buClrTx/>
+              <a:buSzTx/>
+              <a:buFont typeface="Arial"/>
+              <a:buChar char="•"/>
+              <a:tabLst/>
+              <a:defRPr/>
+            </a:pPr>
+            <a:r>
+              <a:rPr lang="en-US" baseline="0" dirty="0"/>
+              <a:t>Encapsulation: Exposing a minimal interface of an object to describe interaction points while    hiding implementation details.</a:t>
+            </a:r>
+          </a:p>
+          <a:p>
+            <a:pPr marL="171450" marR="0" lvl="0" indent="-171450" algn="l" defTabSz="914400" rtl="0" eaLnBrk="1" fontAlgn="auto" latinLnBrk="0" hangingPunct="1">
+              <a:lnSpc>
+                <a:spcPct val="100000"/>
+              </a:lnSpc>
+              <a:spcBef>
+                <a:spcPts val="0"/>
+              </a:spcBef>
+              <a:spcAft>
+                <a:spcPts val="0"/>
+              </a:spcAft>
+              <a:buClrTx/>
+              <a:buSzTx/>
+              <a:buFont typeface="Arial"/>
+              <a:buChar char="•"/>
+              <a:tabLst/>
+              <a:defRPr/>
+            </a:pPr>
+            <a:r>
+              <a:rPr lang="en-US" baseline="0" dirty="0"/>
+              <a:t>Separation of concerns (</a:t>
+            </a:r>
+            <a:r>
+              <a:rPr lang="en-US" baseline="0" dirty="0" err="1"/>
+              <a:t>SoC</a:t>
+            </a:r>
+            <a:r>
+              <a:rPr lang="en-US" baseline="0" dirty="0"/>
+              <a:t>): A design principle that involves separating code based on concerns. </a:t>
+            </a:r>
+          </a:p>
+          <a:p>
+            <a:pPr marL="457200" marR="0" lvl="1" indent="0" algn="l" defTabSz="914400" rtl="0" eaLnBrk="1" fontAlgn="auto" latinLnBrk="0" hangingPunct="1">
               <a:lnSpc>
                 <a:spcPct val="100000"/>
               </a:lnSpc>
@@ -3162,51 +3136,8 @@
             </a:pPr>
             <a:r>
               <a:rPr lang="en-US" baseline="0" dirty="0"/>
-              <a:t> Determine what code needs to call platform APIs and isolate it.</a:t>
-            </a:r>
-          </a:p>
-          <a:p>
-            <a:pPr marL="0" marR="0" lvl="0" indent="0" algn="l" defTabSz="914400" rtl="0" eaLnBrk="1" fontAlgn="auto" latinLnBrk="0" hangingPunct="1">
-              <a:lnSpc>
-                <a:spcPct val="100000"/>
-              </a:lnSpc>
-              <a:spcBef>
-                <a:spcPts val="0"/>
-              </a:spcBef>
-              <a:spcAft>
-                <a:spcPts val="0"/>
-              </a:spcAft>
-              <a:buClrTx/>
-              <a:buSzTx/>
-              <a:buFont typeface="Arial" pitchFamily="34" charset="0"/>
-              <a:buChar char="•"/>
-              <a:tabLst/>
-              <a:defRPr/>
-            </a:pPr>
-            <a:r>
-              <a:rPr lang="en-US" baseline="0" dirty="0"/>
-              <a:t> Create parent interfaces or abstract classes to define protocols for platform-specific implementations.</a:t>
-            </a:r>
-          </a:p>
-          <a:p>
-            <a:pPr marL="171450" marR="0" lvl="0" indent="-171450" algn="l" defTabSz="914400" rtl="0" eaLnBrk="1" fontAlgn="auto" latinLnBrk="0" hangingPunct="1">
-              <a:lnSpc>
-                <a:spcPct val="100000"/>
-              </a:lnSpc>
-              <a:spcBef>
-                <a:spcPts val="0"/>
-              </a:spcBef>
-              <a:spcAft>
-                <a:spcPts val="0"/>
-              </a:spcAft>
-              <a:buClrTx/>
-              <a:buSzTx/>
-              <a:buFont typeface="Arial" panose="020B0604020202020204" pitchFamily="34" charset="0"/>
-              <a:buChar char="•"/>
-              <a:tabLst/>
-              <a:defRPr/>
-            </a:pPr>
-            <a:endParaRPr lang="en-US" dirty="0"/>
+              <a:t> Concerns could be something as generic as user interface or data access, or as specific as different kinds of similar objects.</a:t>
+            </a:r>
           </a:p>
         </p:txBody>
       </p:sp>
@@ -3227,7 +3158,6 @@
           <a:p>
             <a:fld id="{01283FAC-A721-45A3-BBDE-EAF2B09B7CD9}" type="slidenum">
               <a:rPr lang="en-US" smtClean="0"/>
-              <a:pPr/>
               <a:t>23</a:t>
             </a:fld>
             <a:endParaRPr lang="en-US"/>
@@ -3237,7 +3167,7 @@
     </p:spTree>
     <p:extLst>
       <p:ext uri="{BB962C8B-B14F-4D97-AF65-F5344CB8AC3E}">
-        <p14:creationId xmlns:p14="http://schemas.microsoft.com/office/powerpoint/2010/main" val="1913416203"/>
+        <p14:creationId xmlns:p14="http://schemas.microsoft.com/office/powerpoint/2010/main" val="441908279"/>
       </p:ext>
     </p:extLst>
   </p:cSld>
@@ -3291,6 +3221,92 @@
           <a:bodyPr/>
           <a:lstStyle/>
           <a:p>
+            <a:pPr marL="0" marR="0" lvl="0" indent="0" algn="l" defTabSz="914400" rtl="0" eaLnBrk="1" fontAlgn="auto" latinLnBrk="0" hangingPunct="1">
+              <a:lnSpc>
+                <a:spcPct val="100000"/>
+              </a:lnSpc>
+              <a:spcBef>
+                <a:spcPts val="0"/>
+              </a:spcBef>
+              <a:spcAft>
+                <a:spcPts val="0"/>
+              </a:spcAft>
+              <a:buClrTx/>
+              <a:buSzTx/>
+              <a:buFontTx/>
+              <a:buNone/>
+              <a:tabLst/>
+              <a:defRPr/>
+            </a:pPr>
+            <a:r>
+              <a:rPr lang="en-US" b="1" baseline="0" dirty="0"/>
+              <a:t>Notes:</a:t>
+            </a:r>
+          </a:p>
+          <a:p>
+            <a:pPr marL="0" marR="0" lvl="0" indent="0" algn="l" defTabSz="914400" rtl="0" eaLnBrk="1" fontAlgn="auto" latinLnBrk="0" hangingPunct="1">
+              <a:lnSpc>
+                <a:spcPct val="100000"/>
+              </a:lnSpc>
+              <a:spcBef>
+                <a:spcPts val="0"/>
+              </a:spcBef>
+              <a:spcAft>
+                <a:spcPts val="0"/>
+              </a:spcAft>
+              <a:buClrTx/>
+              <a:buSzTx/>
+              <a:buFont typeface="Arial" pitchFamily="34" charset="0"/>
+              <a:buChar char="•"/>
+              <a:tabLst/>
+              <a:defRPr/>
+            </a:pPr>
+            <a:r>
+              <a:rPr lang="en-US" baseline="0" dirty="0"/>
+              <a:t> Determine what code needs to call platform APIs and isolate it.</a:t>
+            </a:r>
+          </a:p>
+          <a:p>
+            <a:pPr marL="0" marR="0" lvl="0" indent="0" algn="l" defTabSz="914400" rtl="0" eaLnBrk="1" fontAlgn="auto" latinLnBrk="0" hangingPunct="1">
+              <a:lnSpc>
+                <a:spcPct val="100000"/>
+              </a:lnSpc>
+              <a:spcBef>
+                <a:spcPts val="0"/>
+              </a:spcBef>
+              <a:spcAft>
+                <a:spcPts val="0"/>
+              </a:spcAft>
+              <a:buClrTx/>
+              <a:buSzTx/>
+              <a:buFont typeface="Arial" pitchFamily="34" charset="0"/>
+              <a:buChar char="•"/>
+              <a:tabLst/>
+              <a:defRPr/>
+            </a:pPr>
+            <a:r>
+              <a:rPr lang="en-US" baseline="0" dirty="0"/>
+              <a:t> Create parent interfaces or abstract classes to define protocols for platform-specific implementations.</a:t>
+            </a:r>
+          </a:p>
+          <a:p>
+            <a:pPr marL="171450" marR="0" lvl="0" indent="-171450" algn="l" defTabSz="914400" rtl="0" eaLnBrk="1" fontAlgn="auto" latinLnBrk="0" hangingPunct="1">
+              <a:lnSpc>
+                <a:spcPct val="100000"/>
+              </a:lnSpc>
+              <a:spcBef>
+                <a:spcPts val="0"/>
+              </a:spcBef>
+              <a:spcAft>
+                <a:spcPts val="0"/>
+              </a:spcAft>
+              <a:buClrTx/>
+              <a:buSzTx/>
+              <a:buFont typeface="Arial" panose="020B0604020202020204" pitchFamily="34" charset="0"/>
+              <a:buChar char="•"/>
+              <a:tabLst/>
+              <a:defRPr/>
+            </a:pPr>
             <a:endParaRPr lang="en-US" dirty="0"/>
           </a:p>
         </p:txBody>
@@ -3312,7 +3328,92 @@
           <a:p>
             <a:fld id="{01283FAC-A721-45A3-BBDE-EAF2B09B7CD9}" type="slidenum">
               <a:rPr lang="en-US" smtClean="0"/>
+              <a:pPr/>
               <a:t>24</a:t>
+            </a:fld>
+            <a:endParaRPr lang="en-US"/>
+          </a:p>
+        </p:txBody>
+      </p:sp>
+    </p:spTree>
+    <p:extLst>
+      <p:ext uri="{BB962C8B-B14F-4D97-AF65-F5344CB8AC3E}">
+        <p14:creationId xmlns:p14="http://schemas.microsoft.com/office/powerpoint/2010/main" val="1913416203"/>
+      </p:ext>
+    </p:extLst>
+  </p:cSld>
+  <p:clrMapOvr>
+    <a:masterClrMapping/>
+  </p:clrMapOvr>
+</p:notes>
+</file>
+
+<file path=ppt/notesSlides/notesSlide25.xml><?xml version="1.0" encoding="utf-8"?>
+<p:notes xmlns:a="http://schemas.openxmlformats.org/drawingml/2006/main" xmlns:r="http://schemas.openxmlformats.org/officeDocument/2006/relationships" xmlns:p="http://schemas.openxmlformats.org/presentationml/2006/main">
+  <p:cSld>
+    <p:spTree>
+      <p:nvGrpSpPr>
+        <p:cNvPr id="1" name=""/>
+        <p:cNvGrpSpPr/>
+        <p:nvPr/>
+      </p:nvGrpSpPr>
+      <p:grpSpPr>
+        <a:xfrm>
+          <a:off x="0" y="0"/>
+          <a:ext cx="0" cy="0"/>
+          <a:chOff x="0" y="0"/>
+          <a:chExt cx="0" cy="0"/>
+        </a:xfrm>
+      </p:grpSpPr>
+      <p:sp>
+        <p:nvSpPr>
+          <p:cNvPr id="2" name="Slide Image Placeholder 1"/>
+          <p:cNvSpPr>
+            <a:spLocks noGrp="1" noRot="1" noChangeAspect="1"/>
+          </p:cNvSpPr>
+          <p:nvPr>
+            <p:ph type="sldImg"/>
+          </p:nvPr>
+        </p:nvSpPr>
+        <p:spPr/>
+      </p:sp>
+      <p:sp>
+        <p:nvSpPr>
+          <p:cNvPr id="3" name="Notes Placeholder 2"/>
+          <p:cNvSpPr>
+            <a:spLocks noGrp="1"/>
+          </p:cNvSpPr>
+          <p:nvPr>
+            <p:ph type="body" idx="1"/>
+          </p:nvPr>
+        </p:nvSpPr>
+        <p:spPr/>
+        <p:txBody>
+          <a:bodyPr/>
+          <a:lstStyle/>
+          <a:p>
+            <a:endParaRPr lang="en-US" dirty="0"/>
+          </a:p>
+        </p:txBody>
+      </p:sp>
+      <p:sp>
+        <p:nvSpPr>
+          <p:cNvPr id="4" name="Slide Number Placeholder 3"/>
+          <p:cNvSpPr>
+            <a:spLocks noGrp="1"/>
+          </p:cNvSpPr>
+          <p:nvPr>
+            <p:ph type="sldNum" sz="quarter" idx="10"/>
+          </p:nvPr>
+        </p:nvSpPr>
+        <p:spPr/>
+        <p:txBody>
+          <a:bodyPr/>
+          <a:lstStyle/>
+          <a:p>
+            <a:fld id="{01283FAC-A721-45A3-BBDE-EAF2B09B7CD9}" type="slidenum">
+              <a:rPr lang="en-US" smtClean="0"/>
+              <a:t>25</a:t>
             </a:fld>
             <a:endParaRPr lang="en-US"/>
           </a:p>
@@ -3539,7 +3640,7 @@
           </a:ln>
           <a:extLst>
             <a:ext uri="{909E8E84-426E-40dd-AFC4-6F175D3DCCD1}">
-              <a14:hiddenFill xmlns:a14="http://schemas.microsoft.com/office/drawing/2010/main" xmlns="">
+              <a14:hiddenFill xmlns="" xmlns:a14="http://schemas.microsoft.com/office/drawing/2010/main">
                 <a:solidFill>
                   <a:srgbClr val="FFFFFF"/>
                 </a:solidFill>
@@ -3562,14 +3663,14 @@
           <a:noFill/>
           <a:extLst>
             <a:ext uri="{909E8E84-426E-40dd-AFC4-6F175D3DCCD1}">
-              <a14:hiddenFill xmlns:a14="http://schemas.microsoft.com/office/drawing/2010/main" xmlns="">
+              <a14:hiddenFill xmlns="" xmlns:a14="http://schemas.microsoft.com/office/drawing/2010/main">
                 <a:solidFill>
                   <a:srgbClr val="FFFFFF"/>
                 </a:solidFill>
               </a14:hiddenFill>
             </a:ext>
             <a:ext uri="{91240B29-F687-4f45-9708-019B960494DF}">
-              <a14:hiddenLine xmlns:a14="http://schemas.microsoft.com/office/drawing/2010/main" xmlns="" w="9525">
+              <a14:hiddenLine xmlns="" xmlns:a14="http://schemas.microsoft.com/office/drawing/2010/main" w="9525">
                 <a:solidFill>
                   <a:srgbClr val="000000"/>
                 </a:solidFill>
@@ -3593,7 +3694,7 @@
               <a:buNone/>
             </a:pPr>
             <a:r>
-              <a:rPr lang="en-US" altLang="en-US" b="1" dirty="0" smtClean="0"/>
+              <a:rPr lang="en-US" altLang="en-US" b="1" dirty="0"/>
               <a:t>References:</a:t>
             </a:r>
           </a:p>
@@ -3603,12 +3704,8 @@
               <a:buChar char="•"/>
             </a:pPr>
             <a:r>
-              <a:rPr lang="en-US" altLang="en-US" dirty="0" smtClean="0"/>
-              <a:t>Image </a:t>
-            </a:r>
-            <a:r>
               <a:rPr lang="en-US" altLang="en-US" dirty="0"/>
-              <a:t>courtesy of Xamarin</a:t>
+              <a:t>Image courtesy of Xamarin</a:t>
             </a:r>
           </a:p>
         </p:txBody>
@@ -3627,14 +3724,14 @@
           <a:noFill/>
           <a:extLst>
             <a:ext uri="{909E8E84-426E-40dd-AFC4-6F175D3DCCD1}">
-              <a14:hiddenFill xmlns:a14="http://schemas.microsoft.com/office/drawing/2010/main" xmlns="">
+              <a14:hiddenFill xmlns="" xmlns:a14="http://schemas.microsoft.com/office/drawing/2010/main">
                 <a:solidFill>
                   <a:srgbClr val="FFFFFF"/>
                 </a:solidFill>
               </a14:hiddenFill>
             </a:ext>
             <a:ext uri="{91240B29-F687-4f45-9708-019B960494DF}">
-              <a14:hiddenLine xmlns:a14="http://schemas.microsoft.com/office/drawing/2010/main" xmlns="" w="9525">
+              <a14:hiddenLine xmlns="" xmlns:a14="http://schemas.microsoft.com/office/drawing/2010/main" w="9525">
                 <a:solidFill>
                   <a:srgbClr val="000000"/>
                 </a:solidFill>
@@ -3830,7 +3927,7 @@
               <a:defRPr/>
             </a:pPr>
             <a:r>
-              <a:rPr lang="en-US" b="1" dirty="0" smtClean="0"/>
+              <a:rPr lang="en-US" b="1" dirty="0"/>
               <a:t>Notes:</a:t>
             </a:r>
           </a:p>
@@ -3853,12 +3950,8 @@
               <a:defRPr/>
             </a:pPr>
             <a:r>
-              <a:rPr lang="en-US" b="0" dirty="0" smtClean="0"/>
-              <a:t>Benefits </a:t>
-            </a:r>
-            <a:r>
               <a:rPr lang="en-US" b="0" dirty="0"/>
-              <a:t>of C#:</a:t>
+              <a:t>Benefits of C#:</a:t>
             </a:r>
           </a:p>
           <a:p>
@@ -3898,11 +3991,7 @@
             </a:pPr>
             <a:r>
               <a:rPr lang="en-US" dirty="0"/>
-              <a:t>Syntactically similar to C and C+</a:t>
-            </a:r>
-            <a:r>
-              <a:rPr lang="en-US" dirty="0" smtClean="0"/>
-              <a:t>+</a:t>
+              <a:t>Syntactically similar to C and C++</a:t>
             </a:r>
           </a:p>
           <a:p>
@@ -4905,7 +4994,7 @@
             <a:fld id="{0459C166-16D3-4A25-A2F8-C51E0E346B22}" type="datetimeFigureOut">
               <a:rPr lang="en-US" smtClean="0"/>
               <a:pPr/>
-              <a:t>9/9/16</a:t>
+              <a:t>11/1/16</a:t>
             </a:fld>
             <a:endParaRPr lang="en-US"/>
           </a:p>
@@ -5075,7 +5164,7 @@
             <a:fld id="{0459C166-16D3-4A25-A2F8-C51E0E346B22}" type="datetimeFigureOut">
               <a:rPr lang="en-US" smtClean="0"/>
               <a:pPr/>
-              <a:t>9/9/16</a:t>
+              <a:t>11/1/16</a:t>
             </a:fld>
             <a:endParaRPr lang="en-US"/>
           </a:p>
@@ -5255,7 +5344,7 @@
             <a:fld id="{0459C166-16D3-4A25-A2F8-C51E0E346B22}" type="datetimeFigureOut">
               <a:rPr lang="en-US" smtClean="0"/>
               <a:pPr/>
-              <a:t>9/9/16</a:t>
+              <a:t>11/1/16</a:t>
             </a:fld>
             <a:endParaRPr lang="en-US"/>
           </a:p>
@@ -5425,7 +5514,7 @@
             <a:fld id="{0459C166-16D3-4A25-A2F8-C51E0E346B22}" type="datetimeFigureOut">
               <a:rPr lang="en-US" smtClean="0"/>
               <a:pPr/>
-              <a:t>9/9/16</a:t>
+              <a:t>11/1/16</a:t>
             </a:fld>
             <a:endParaRPr lang="en-US"/>
           </a:p>
@@ -5692,7 +5781,7 @@
             <a:fld id="{0459C166-16D3-4A25-A2F8-C51E0E346B22}" type="datetimeFigureOut">
               <a:rPr lang="en-US" smtClean="0"/>
               <a:pPr/>
-              <a:t>9/9/16</a:t>
+              <a:t>11/1/16</a:t>
             </a:fld>
             <a:endParaRPr lang="en-US"/>
           </a:p>
@@ -5939,7 +6028,7 @@
             <a:fld id="{0459C166-16D3-4A25-A2F8-C51E0E346B22}" type="datetimeFigureOut">
               <a:rPr lang="en-US" smtClean="0"/>
               <a:pPr/>
-              <a:t>9/9/16</a:t>
+              <a:t>11/1/16</a:t>
             </a:fld>
             <a:endParaRPr lang="en-US"/>
           </a:p>
@@ -6305,7 +6394,7 @@
             <a:fld id="{0459C166-16D3-4A25-A2F8-C51E0E346B22}" type="datetimeFigureOut">
               <a:rPr lang="en-US" smtClean="0"/>
               <a:pPr/>
-              <a:t>9/9/16</a:t>
+              <a:t>11/1/16</a:t>
             </a:fld>
             <a:endParaRPr lang="en-US"/>
           </a:p>
@@ -6424,7 +6513,7 @@
             <a:fld id="{0459C166-16D3-4A25-A2F8-C51E0E346B22}" type="datetimeFigureOut">
               <a:rPr lang="en-US" smtClean="0"/>
               <a:pPr/>
-              <a:t>9/9/16</a:t>
+              <a:t>11/1/16</a:t>
             </a:fld>
             <a:endParaRPr lang="en-US"/>
           </a:p>
@@ -6521,7 +6610,7 @@
             <a:fld id="{0459C166-16D3-4A25-A2F8-C51E0E346B22}" type="datetimeFigureOut">
               <a:rPr lang="en-US" smtClean="0"/>
               <a:pPr/>
-              <a:t>9/9/16</a:t>
+              <a:t>11/1/16</a:t>
             </a:fld>
             <a:endParaRPr lang="en-US"/>
           </a:p>
@@ -6798,7 +6887,7 @@
             <a:fld id="{0459C166-16D3-4A25-A2F8-C51E0E346B22}" type="datetimeFigureOut">
               <a:rPr lang="en-US" smtClean="0"/>
               <a:pPr/>
-              <a:t>9/9/16</a:t>
+              <a:t>11/1/16</a:t>
             </a:fld>
             <a:endParaRPr lang="en-US"/>
           </a:p>
@@ -7052,7 +7141,7 @@
             <a:fld id="{0459C166-16D3-4A25-A2F8-C51E0E346B22}" type="datetimeFigureOut">
               <a:rPr lang="en-US" smtClean="0"/>
               <a:pPr/>
-              <a:t>9/9/16</a:t>
+              <a:t>11/1/16</a:t>
             </a:fld>
             <a:endParaRPr lang="en-US"/>
           </a:p>
@@ -7265,7 +7354,7 @@
             <a:fld id="{0459C166-16D3-4A25-A2F8-C51E0E346B22}" type="datetimeFigureOut">
               <a:rPr lang="en-US" smtClean="0"/>
               <a:pPr/>
-              <a:t>9/9/16</a:t>
+              <a:t>11/1/16</a:t>
             </a:fld>
             <a:endParaRPr lang="en-US"/>
           </a:p>
@@ -9453,21 +9542,8 @@
                   <a:srgbClr val="000000"/>
                 </a:solidFill>
               </a:rPr>
-              <a:t>Platform-specific approach provides greater access to OS UI </a:t>
-            </a:r>
-            <a:r>
-              <a:rPr lang="en-US" sz="2400" dirty="0" smtClean="0">
-                <a:solidFill>
-                  <a:srgbClr val="000000"/>
-                </a:solidFill>
-              </a:rPr>
-              <a:t>APIs</a:t>
-            </a:r>
-            <a:endParaRPr lang="en-US" sz="2400" dirty="0">
-              <a:solidFill>
-                <a:srgbClr val="000000"/>
-              </a:solidFill>
-            </a:endParaRPr>
+              <a:t>Platform-specific approach provides greater access to OS UI APIs</a:t>
+            </a:r>
           </a:p>
         </p:txBody>
       </p:sp>
@@ -10625,14 +10701,14 @@
           </a:ln>
           <a:extLst>
             <a:ext uri="{909E8E84-426E-40dd-AFC4-6F175D3DCCD1}">
-              <a14:hiddenFill xmlns:a14="http://schemas.microsoft.com/office/drawing/2010/main" xmlns="">
+              <a14:hiddenFill xmlns="" xmlns:a14="http://schemas.microsoft.com/office/drawing/2010/main">
                 <a:solidFill>
                   <a:srgbClr val="FFFFFF"/>
                 </a:solidFill>
               </a14:hiddenFill>
             </a:ext>
             <a:ext uri="{91240B29-F687-4f45-9708-019B960494DF}">
-              <a14:hiddenLine xmlns:a14="http://schemas.microsoft.com/office/drawing/2010/main" xmlns="" w="9525">
+              <a14:hiddenLine xmlns="" xmlns:a14="http://schemas.microsoft.com/office/drawing/2010/main" w="9525">
                 <a:solidFill>
                   <a:srgbClr val="000000"/>
                 </a:solidFill>
@@ -10851,14 +10927,14 @@
           </a:ln>
           <a:extLst>
             <a:ext uri="{909E8E84-426E-40dd-AFC4-6F175D3DCCD1}">
-              <a14:hiddenFill xmlns:a14="http://schemas.microsoft.com/office/drawing/2010/main" xmlns="">
+              <a14:hiddenFill xmlns="" xmlns:a14="http://schemas.microsoft.com/office/drawing/2010/main">
                 <a:solidFill>
                   <a:srgbClr val="FFFFFF"/>
                 </a:solidFill>
               </a14:hiddenFill>
             </a:ext>
             <a:ext uri="{91240B29-F687-4f45-9708-019B960494DF}">
-              <a14:hiddenLine xmlns:a14="http://schemas.microsoft.com/office/drawing/2010/main" xmlns="" w="9525">
+              <a14:hiddenLine xmlns="" xmlns:a14="http://schemas.microsoft.com/office/drawing/2010/main" w="9525">
                 <a:solidFill>
                   <a:srgbClr val="000000"/>
                 </a:solidFill>
@@ -11083,42 +11159,15 @@
               <a:defRPr/>
             </a:pPr>
             <a:r>
-              <a:rPr lang="en-US" sz="2400" dirty="0" smtClean="0">
+              <a:rPr lang="en-US" sz="2400" dirty="0">
                 <a:solidFill>
                   <a:srgbClr val="000000"/>
                 </a:solidFill>
                 <a:latin typeface="Segoe UI"/>
                 <a:cs typeface="Segoe UI"/>
               </a:rPr>
-              <a:t>Shared in C#</a:t>
-            </a:r>
-            <a:r>
-              <a:rPr lang="en-US" sz="2400" dirty="0">
-                <a:solidFill>
-                  <a:srgbClr val="000000"/>
-                </a:solidFill>
-                <a:latin typeface="Segoe UI"/>
-                <a:cs typeface="Segoe UI"/>
-              </a:rPr>
-              <a:t> </a:t>
-            </a:r>
-            <a:r>
-              <a:rPr lang="en-US" sz="2400" dirty="0" smtClean="0">
-                <a:solidFill>
-                  <a:srgbClr val="000000"/>
-                </a:solidFill>
-                <a:latin typeface="Segoe UI"/>
-                <a:cs typeface="Segoe UI"/>
-              </a:rPr>
-              <a:t>or XAML</a:t>
-            </a:r>
-            <a:endParaRPr lang="en-US" sz="2400" dirty="0">
-              <a:solidFill>
-                <a:srgbClr val="000000"/>
-              </a:solidFill>
-              <a:latin typeface="Segoe UI"/>
-              <a:cs typeface="Segoe UI"/>
-            </a:endParaRPr>
+              <a:t>Shared in C# or XAML</a:t>
+            </a:r>
           </a:p>
           <a:p>
             <a:pPr marL="342900" indent="-342900">
@@ -11134,25 +11183,8 @@
                 <a:latin typeface="Segoe UI"/>
                 <a:cs typeface="Segoe UI"/>
               </a:rPr>
-              <a:t>Shared app logic code in C</a:t>
-            </a:r>
-            <a:r>
-              <a:rPr lang="en-US" sz="2400" dirty="0" smtClean="0">
-                <a:solidFill>
-                  <a:srgbClr val="000000"/>
-                </a:solidFill>
-                <a:latin typeface="Segoe UI"/>
-                <a:cs typeface="Segoe UI"/>
-              </a:rPr>
-              <a:t>#</a:t>
-            </a:r>
-            <a:endParaRPr lang="en-US" sz="2400" dirty="0">
-              <a:solidFill>
-                <a:srgbClr val="000000"/>
-              </a:solidFill>
-              <a:latin typeface="Segoe UI"/>
-              <a:cs typeface="Segoe UI"/>
-            </a:endParaRPr>
+              <a:t>Shared app logic code in C#</a:t>
+            </a:r>
           </a:p>
           <a:p>
             <a:pPr marL="342900" indent="-342900">
@@ -11188,25 +11220,8 @@
                 <a:latin typeface="Segoe UI"/>
                 <a:cs typeface="Segoe UI"/>
               </a:rPr>
-              <a:t> with platform-specific </a:t>
-            </a:r>
-            <a:r>
-              <a:rPr lang="en-US" sz="2400" dirty="0" smtClean="0">
-                <a:solidFill>
-                  <a:srgbClr val="000000"/>
-                </a:solidFill>
-                <a:latin typeface="Segoe UI"/>
-                <a:cs typeface="Segoe UI"/>
-              </a:rPr>
-              <a:t>code</a:t>
-            </a:r>
-            <a:endParaRPr lang="en-US" sz="2400" dirty="0">
-              <a:solidFill>
-                <a:srgbClr val="000000"/>
-              </a:solidFill>
-              <a:latin typeface="Segoe UI"/>
-              <a:cs typeface="Segoe UI"/>
-            </a:endParaRPr>
+              <a:t> with platform-specific code</a:t>
+            </a:r>
           </a:p>
           <a:p>
             <a:pPr marL="342900" indent="-342900">
@@ -11222,25 +11237,8 @@
                 <a:latin typeface="Segoe UI"/>
                 <a:cs typeface="Segoe UI"/>
               </a:rPr>
-              <a:t>Good for forms-based apps with a lot of data entry </a:t>
-            </a:r>
-            <a:r>
-              <a:rPr lang="en-US" sz="2400" dirty="0" smtClean="0">
-                <a:solidFill>
-                  <a:srgbClr val="000000"/>
-                </a:solidFill>
-                <a:latin typeface="Segoe UI"/>
-                <a:cs typeface="Segoe UI"/>
-              </a:rPr>
-              <a:t>screens</a:t>
-            </a:r>
-            <a:endParaRPr lang="en-US" sz="2400" dirty="0">
-              <a:solidFill>
-                <a:srgbClr val="000000"/>
-              </a:solidFill>
-              <a:latin typeface="Segoe UI"/>
-              <a:cs typeface="Segoe UI"/>
-            </a:endParaRPr>
+              <a:t>Good for forms-based apps with a lot of data entry screens</a:t>
+            </a:r>
           </a:p>
           <a:p>
             <a:pPr marL="342900" indent="-342900">
@@ -11256,27 +11254,7 @@
                 <a:latin typeface="Segoe UI"/>
                 <a:cs typeface="Segoe UI"/>
               </a:rPr>
-              <a:t>Easy to learn API makes you productive </a:t>
-            </a:r>
-            <a:r>
-              <a:rPr lang="en-US" sz="2400" dirty="0" smtClean="0">
-                <a:solidFill>
-                  <a:srgbClr val="000000"/>
-                </a:solidFill>
-                <a:latin typeface="Segoe UI"/>
-                <a:cs typeface="Segoe UI"/>
-              </a:rPr>
-              <a:t>immediately</a:t>
-            </a:r>
-            <a:r>
-              <a:rPr lang="en-US" sz="2400" dirty="0">
-                <a:solidFill>
-                  <a:srgbClr val="000000"/>
-                </a:solidFill>
-                <a:latin typeface="Segoe UI"/>
-                <a:cs typeface="Segoe UI"/>
-              </a:rPr>
-              <a:t>, without platform-specific knowledge </a:t>
+              <a:t>Easy to learn API makes you productive immediately, without platform-specific knowledge </a:t>
             </a:r>
           </a:p>
         </p:txBody>
@@ -11508,15 +11486,13 @@
                     <a:rPr lang="en-US" dirty="0"/>
                     <a:t> </a:t>
                   </a:r>
-                  <a:endParaRPr lang="en-US" dirty="0" smtClean="0"/>
                 </a:p>
                 <a:p>
                   <a:pPr algn="ctr"/>
                   <a:r>
-                    <a:rPr lang="en-US" dirty="0" smtClean="0"/>
+                    <a:rPr lang="en-US" dirty="0"/>
                     <a:t>App</a:t>
                   </a:r>
-                  <a:endParaRPr lang="en-US" dirty="0"/>
                 </a:p>
               </p:txBody>
             </p:sp>
@@ -12004,14 +11980,14 @@
           </a:ln>
           <a:extLst>
             <a:ext uri="{909E8E84-426E-40dd-AFC4-6F175D3DCCD1}">
-              <a14:hiddenFill xmlns:a14="http://schemas.microsoft.com/office/drawing/2010/main" xmlns="">
+              <a14:hiddenFill xmlns="" xmlns:a14="http://schemas.microsoft.com/office/drawing/2010/main">
                 <a:solidFill>
                   <a:srgbClr val="FFFFFF"/>
                 </a:solidFill>
               </a14:hiddenFill>
             </a:ext>
             <a:ext uri="{91240B29-F687-4f45-9708-019B960494DF}">
-              <a14:hiddenLine xmlns:a14="http://schemas.microsoft.com/office/drawing/2010/main" xmlns="" w="9525">
+              <a14:hiddenLine xmlns="" xmlns:a14="http://schemas.microsoft.com/office/drawing/2010/main" w="9525">
                 <a:solidFill>
                   <a:srgbClr val="000000"/>
                 </a:solidFill>
@@ -12230,14 +12206,14 @@
           </a:ln>
           <a:extLst>
             <a:ext uri="{909E8E84-426E-40dd-AFC4-6F175D3DCCD1}">
-              <a14:hiddenFill xmlns:a14="http://schemas.microsoft.com/office/drawing/2010/main" xmlns="">
+              <a14:hiddenFill xmlns="" xmlns:a14="http://schemas.microsoft.com/office/drawing/2010/main">
                 <a:solidFill>
                   <a:srgbClr val="FFFFFF"/>
                 </a:solidFill>
               </a14:hiddenFill>
             </a:ext>
             <a:ext uri="{91240B29-F687-4f45-9708-019B960494DF}">
-              <a14:hiddenLine xmlns:a14="http://schemas.microsoft.com/office/drawing/2010/main" xmlns="" w="9525">
+              <a14:hiddenLine xmlns="" xmlns:a14="http://schemas.microsoft.com/office/drawing/2010/main" w="9525">
                 <a:solidFill>
                   <a:srgbClr val="000000"/>
                 </a:solidFill>
@@ -12456,14 +12432,14 @@
           </a:ln>
           <a:extLst>
             <a:ext uri="{909E8E84-426E-40dd-AFC4-6F175D3DCCD1}">
-              <a14:hiddenFill xmlns:a14="http://schemas.microsoft.com/office/drawing/2010/main" xmlns="">
+              <a14:hiddenFill xmlns="" xmlns:a14="http://schemas.microsoft.com/office/drawing/2010/main">
                 <a:solidFill>
                   <a:srgbClr val="FFFFFF"/>
                 </a:solidFill>
               </a14:hiddenFill>
             </a:ext>
             <a:ext uri="{91240B29-F687-4f45-9708-019B960494DF}">
-              <a14:hiddenLine xmlns:a14="http://schemas.microsoft.com/office/drawing/2010/main" xmlns="" w="9525">
+              <a14:hiddenLine xmlns="" xmlns:a14="http://schemas.microsoft.com/office/drawing/2010/main" w="9525">
                 <a:solidFill>
                   <a:srgbClr val="000000"/>
                 </a:solidFill>
@@ -12682,14 +12658,14 @@
           </a:ln>
           <a:extLst>
             <a:ext uri="{909E8E84-426E-40dd-AFC4-6F175D3DCCD1}">
-              <a14:hiddenFill xmlns:a14="http://schemas.microsoft.com/office/drawing/2010/main" xmlns="">
+              <a14:hiddenFill xmlns="" xmlns:a14="http://schemas.microsoft.com/office/drawing/2010/main">
                 <a:solidFill>
                   <a:srgbClr val="FFFFFF"/>
                 </a:solidFill>
               </a14:hiddenFill>
             </a:ext>
             <a:ext uri="{91240B29-F687-4f45-9708-019B960494DF}">
-              <a14:hiddenLine xmlns:a14="http://schemas.microsoft.com/office/drawing/2010/main" xmlns="" w="9525">
+              <a14:hiddenLine xmlns="" xmlns:a14="http://schemas.microsoft.com/office/drawing/2010/main" w="9525">
                 <a:solidFill>
                   <a:srgbClr val="000000"/>
                 </a:solidFill>
@@ -12838,14 +12814,14 @@
           </a:ln>
           <a:extLst>
             <a:ext uri="{909E8E84-426E-40dd-AFC4-6F175D3DCCD1}">
-              <a14:hiddenFill xmlns:a14="http://schemas.microsoft.com/office/drawing/2010/main" xmlns="">
+              <a14:hiddenFill xmlns="" xmlns:a14="http://schemas.microsoft.com/office/drawing/2010/main">
                 <a:solidFill>
                   <a:srgbClr val="FFFFFF"/>
                 </a:solidFill>
               </a14:hiddenFill>
             </a:ext>
             <a:ext uri="{91240B29-F687-4f45-9708-019B960494DF}">
-              <a14:hiddenLine xmlns:a14="http://schemas.microsoft.com/office/drawing/2010/main" xmlns="" w="9525">
+              <a14:hiddenLine xmlns="" xmlns:a14="http://schemas.microsoft.com/office/drawing/2010/main" w="9525">
                 <a:solidFill>
                   <a:srgbClr val="000000"/>
                 </a:solidFill>
@@ -13924,21 +13900,8 @@
                       <a:prstClr val="white"/>
                     </a:solidFill>
                   </a:rPr>
-                  <a:t>Shared C</a:t>
+                  <a:t>Shared C#/XAML UI</a:t>
                 </a:r>
-                <a:r>
-                  <a:rPr lang="en-US" dirty="0" smtClean="0">
-                    <a:solidFill>
-                      <a:prstClr val="white"/>
-                    </a:solidFill>
-                  </a:rPr>
-                  <a:t>#/XAML UI</a:t>
-                </a:r>
-                <a:endParaRPr lang="en-US" dirty="0">
-                  <a:solidFill>
-                    <a:prstClr val="white"/>
-                  </a:solidFill>
-                </a:endParaRPr>
               </a:p>
             </p:txBody>
           </p:sp>
@@ -14855,13 +14818,8 @@
             </a:pPr>
             <a:r>
               <a:rPr lang="en-US" sz="2400" dirty="0"/>
-              <a:t>Xamarin provides the core functionality of .NET using C</a:t>
-            </a:r>
-            <a:r>
-              <a:rPr lang="en-US" sz="2400" dirty="0" smtClean="0"/>
-              <a:t>#</a:t>
-            </a:r>
-            <a:endParaRPr lang="en-US" sz="2400" dirty="0"/>
+              <a:t>Xamarin provides the core functionality of .NET using C#</a:t>
+            </a:r>
           </a:p>
           <a:p>
             <a:pPr marL="342900" indent="-342900">
@@ -14870,13 +14828,8 @@
             </a:pPr>
             <a:r>
               <a:rPr lang="en-US" sz="2400" dirty="0"/>
-              <a:t>Xamarin.Android binds to the Android </a:t>
-            </a:r>
-            <a:r>
-              <a:rPr lang="en-US" sz="2400" dirty="0" smtClean="0"/>
-              <a:t>SDK</a:t>
-            </a:r>
-            <a:endParaRPr lang="en-US" sz="2400" dirty="0"/>
+              <a:t>Xamarin.Android binds to the Android SDK</a:t>
+            </a:r>
           </a:p>
           <a:p>
             <a:pPr marL="342900" indent="-342900">
@@ -14896,7 +14849,7 @@
               <a:t> </a:t>
             </a:r>
             <a:r>
-              <a:rPr lang="en-US" sz="2400" dirty="0" err="1" smtClean="0"/>
+              <a:rPr lang="en-US" sz="2400" dirty="0" err="1"/>
               <a:t>UIKit</a:t>
             </a:r>
             <a:endParaRPr lang="en-US" sz="2400" dirty="0"/>
@@ -14910,19 +14863,20 @@
               <a:rPr lang="en-US" sz="2400" dirty="0"/>
               <a:t>Xamarin.Forms binds to Xamarin.Android, Xamarin.iOS, </a:t>
             </a:r>
+          </a:p>
+          <a:p>
+            <a:pPr marL="800100" lvl="1" indent="-342900">
+              <a:buFont typeface="Wingdings" charset="2"/>
+              <a:buChar char="§"/>
+            </a:pPr>
             <a:r>
               <a:rPr lang="en-US" sz="2400" i="1" dirty="0"/>
               <a:t>and</a:t>
             </a:r>
             <a:r>
               <a:rPr lang="en-US" sz="2400" dirty="0"/>
-              <a:t> Windows </a:t>
-            </a:r>
-            <a:r>
-              <a:rPr lang="en-US" sz="2400" dirty="0" smtClean="0"/>
-              <a:t>SDK</a:t>
-            </a:r>
-            <a:endParaRPr lang="en-US" sz="2400" dirty="0"/>
+              <a:t> Windows SDK</a:t>
+            </a:r>
           </a:p>
         </p:txBody>
       </p:sp>
@@ -14940,6 +14894,378 @@
 </file>
 
 <file path=ppt/slides/slide21.xml><?xml version="1.0" encoding="utf-8"?>
+<p:sld xmlns:a="http://schemas.openxmlformats.org/drawingml/2006/main" xmlns:r="http://schemas.openxmlformats.org/officeDocument/2006/relationships" xmlns:p="http://schemas.openxmlformats.org/presentationml/2006/main">
+  <p:cSld>
+    <p:spTree>
+      <p:nvGrpSpPr>
+        <p:cNvPr id="1" name=""/>
+        <p:cNvGrpSpPr/>
+        <p:nvPr/>
+      </p:nvGrpSpPr>
+      <p:grpSpPr>
+        <a:xfrm>
+          <a:off x="0" y="0"/>
+          <a:ext cx="0" cy="0"/>
+          <a:chOff x="0" y="0"/>
+          <a:chExt cx="0" cy="0"/>
+        </a:xfrm>
+      </p:grpSpPr>
+      <p:sp>
+        <p:nvSpPr>
+          <p:cNvPr id="2" name="Title 1"/>
+          <p:cNvSpPr>
+            <a:spLocks noGrp="1"/>
+          </p:cNvSpPr>
+          <p:nvPr>
+            <p:ph type="title"/>
+          </p:nvPr>
+        </p:nvSpPr>
+        <p:spPr/>
+        <p:txBody>
+          <a:bodyPr>
+            <a:normAutofit/>
+          </a:bodyPr>
+          <a:lstStyle/>
+          <a:p>
+            <a:r>
+              <a:rPr lang="en-US" dirty="0"/>
+              <a:t>Xamarin.Forms Runs on UWP</a:t>
+            </a:r>
+          </a:p>
+        </p:txBody>
+      </p:sp>
+      <p:sp>
+        <p:nvSpPr>
+          <p:cNvPr id="7" name="Rectangle 6"/>
+          <p:cNvSpPr/>
+          <p:nvPr/>
+        </p:nvSpPr>
+        <p:spPr>
+          <a:xfrm>
+            <a:off x="0" y="1559561"/>
+            <a:ext cx="12160223" cy="791753"/>
+          </a:xfrm>
+          <a:prstGeom prst="rect">
+            <a:avLst/>
+          </a:prstGeom>
+          <a:solidFill>
+            <a:srgbClr val="0070C0"/>
+          </a:solidFill>
+          <a:ln w="9525" cap="flat" cmpd="sng" algn="ctr">
+            <a:noFill/>
+            <a:prstDash val="solid"/>
+          </a:ln>
+          <a:effectLst/>
+        </p:spPr>
+        <p:txBody>
+          <a:bodyPr rtlCol="0" anchor="ctr"/>
+          <a:lstStyle/>
+          <a:p>
+            <a:pPr marL="0" marR="0" lvl="0" indent="0" algn="ctr" defTabSz="914400" eaLnBrk="1" fontAlgn="auto" latinLnBrk="0" hangingPunct="1">
+              <a:lnSpc>
+                <a:spcPct val="100000"/>
+              </a:lnSpc>
+              <a:spcBef>
+                <a:spcPts val="0"/>
+              </a:spcBef>
+              <a:spcAft>
+                <a:spcPts val="0"/>
+              </a:spcAft>
+              <a:buClrTx/>
+              <a:buSzTx/>
+              <a:buFont typeface="Arial" panose="020B0604020202020204" pitchFamily="34" charset="0"/>
+              <a:buNone/>
+              <a:tabLst/>
+              <a:defRPr/>
+            </a:pPr>
+            <a:endParaRPr kumimoji="0" lang="en-US" sz="4000" i="1" u="none" strike="noStrike" kern="0" cap="none" spc="0" normalizeH="0" baseline="0" noProof="0" dirty="0">
+              <a:ln>
+                <a:noFill/>
+              </a:ln>
+              <a:solidFill>
+                <a:prstClr val="white"/>
+              </a:solidFill>
+              <a:effectLst/>
+              <a:uLnTx/>
+              <a:uFillTx/>
+              <a:latin typeface="+mj-lt"/>
+            </a:endParaRPr>
+          </a:p>
+        </p:txBody>
+      </p:sp>
+      <p:sp>
+        <p:nvSpPr>
+          <p:cNvPr id="8" name="Content Placeholder 2"/>
+          <p:cNvSpPr txBox="1">
+            <a:spLocks/>
+          </p:cNvSpPr>
+          <p:nvPr/>
+        </p:nvSpPr>
+        <p:spPr>
+          <a:xfrm>
+            <a:off x="896471" y="1559561"/>
+            <a:ext cx="12133729" cy="791753"/>
+          </a:xfrm>
+          <a:prstGeom prst="rect">
+            <a:avLst/>
+          </a:prstGeom>
+        </p:spPr>
+        <p:txBody>
+          <a:bodyPr anchor="ctr"/>
+          <a:lstStyle>
+            <a:lvl1pPr marL="0" indent="0" algn="ctr" defTabSz="914400" rtl="0" eaLnBrk="1" latinLnBrk="0" hangingPunct="1">
+              <a:lnSpc>
+                <a:spcPct val="90000"/>
+              </a:lnSpc>
+              <a:spcBef>
+                <a:spcPts val="1000"/>
+              </a:spcBef>
+              <a:buFont typeface="Arial" panose="020B0604020202020204" pitchFamily="34" charset="0"/>
+              <a:buNone/>
+              <a:defRPr sz="2800" i="1" kern="1200">
+                <a:solidFill>
+                  <a:schemeClr val="bg1"/>
+                </a:solidFill>
+                <a:latin typeface="+mn-lt"/>
+                <a:ea typeface="+mn-ea"/>
+                <a:cs typeface="+mn-cs"/>
+              </a:defRPr>
+            </a:lvl1pPr>
+            <a:lvl2pPr marL="457200" indent="0" algn="ctr" defTabSz="914400" rtl="0" eaLnBrk="1" latinLnBrk="0" hangingPunct="1">
+              <a:lnSpc>
+                <a:spcPct val="90000"/>
+              </a:lnSpc>
+              <a:spcBef>
+                <a:spcPts val="500"/>
+              </a:spcBef>
+              <a:buFont typeface="Arial" panose="020B0604020202020204" pitchFamily="34" charset="0"/>
+              <a:buNone/>
+              <a:defRPr sz="2400" i="1" kern="1200">
+                <a:solidFill>
+                  <a:schemeClr val="bg1"/>
+                </a:solidFill>
+                <a:latin typeface="+mn-lt"/>
+                <a:ea typeface="+mn-ea"/>
+                <a:cs typeface="+mn-cs"/>
+              </a:defRPr>
+            </a:lvl2pPr>
+            <a:lvl3pPr marL="914400" indent="0" algn="ctr" defTabSz="914400" rtl="0" eaLnBrk="1" latinLnBrk="0" hangingPunct="1">
+              <a:lnSpc>
+                <a:spcPct val="90000"/>
+              </a:lnSpc>
+              <a:spcBef>
+                <a:spcPts val="500"/>
+              </a:spcBef>
+              <a:buFont typeface="Arial" panose="020B0604020202020204" pitchFamily="34" charset="0"/>
+              <a:buNone/>
+              <a:defRPr sz="2000" i="1" kern="1200">
+                <a:solidFill>
+                  <a:schemeClr val="bg1"/>
+                </a:solidFill>
+                <a:latin typeface="+mn-lt"/>
+                <a:ea typeface="+mn-ea"/>
+                <a:cs typeface="+mn-cs"/>
+              </a:defRPr>
+            </a:lvl3pPr>
+            <a:lvl4pPr marL="1371600" indent="0" algn="ctr" defTabSz="914400" rtl="0" eaLnBrk="1" latinLnBrk="0" hangingPunct="1">
+              <a:lnSpc>
+                <a:spcPct val="90000"/>
+              </a:lnSpc>
+              <a:spcBef>
+                <a:spcPts val="500"/>
+              </a:spcBef>
+              <a:buFont typeface="Arial" panose="020B0604020202020204" pitchFamily="34" charset="0"/>
+              <a:buNone/>
+              <a:defRPr sz="1800" i="1" kern="1200">
+                <a:solidFill>
+                  <a:schemeClr val="bg1"/>
+                </a:solidFill>
+                <a:latin typeface="+mn-lt"/>
+                <a:ea typeface="+mn-ea"/>
+                <a:cs typeface="+mn-cs"/>
+              </a:defRPr>
+            </a:lvl4pPr>
+            <a:lvl5pPr marL="1828800" indent="0" algn="ctr" defTabSz="914400" rtl="0" eaLnBrk="1" latinLnBrk="0" hangingPunct="1">
+              <a:lnSpc>
+                <a:spcPct val="90000"/>
+              </a:lnSpc>
+              <a:spcBef>
+                <a:spcPts val="500"/>
+              </a:spcBef>
+              <a:buFont typeface="Arial" panose="020B0604020202020204" pitchFamily="34" charset="0"/>
+              <a:buNone/>
+              <a:defRPr sz="1800" i="1" kern="1200">
+                <a:solidFill>
+                  <a:schemeClr val="bg1"/>
+                </a:solidFill>
+                <a:latin typeface="+mn-lt"/>
+                <a:ea typeface="+mn-ea"/>
+                <a:cs typeface="+mn-cs"/>
+              </a:defRPr>
+            </a:lvl5pPr>
+            <a:lvl6pPr marL="2514600" indent="-228600" algn="l" defTabSz="914400" rtl="0" eaLnBrk="1" latinLnBrk="0" hangingPunct="1">
+              <a:lnSpc>
+                <a:spcPct val="90000"/>
+              </a:lnSpc>
+              <a:spcBef>
+                <a:spcPts val="500"/>
+              </a:spcBef>
+              <a:buFont typeface="Arial" panose="020B0604020202020204" pitchFamily="34" charset="0"/>
+              <a:buChar char="•"/>
+              <a:defRPr sz="1800" kern="1200">
+                <a:solidFill>
+                  <a:schemeClr val="tx1"/>
+                </a:solidFill>
+                <a:latin typeface="+mn-lt"/>
+                <a:ea typeface="+mn-ea"/>
+                <a:cs typeface="+mn-cs"/>
+              </a:defRPr>
+            </a:lvl6pPr>
+            <a:lvl7pPr marL="2971800" indent="-228600" algn="l" defTabSz="914400" rtl="0" eaLnBrk="1" latinLnBrk="0" hangingPunct="1">
+              <a:lnSpc>
+                <a:spcPct val="90000"/>
+              </a:lnSpc>
+              <a:spcBef>
+                <a:spcPts val="500"/>
+              </a:spcBef>
+              <a:buFont typeface="Arial" panose="020B0604020202020204" pitchFamily="34" charset="0"/>
+              <a:buChar char="•"/>
+              <a:defRPr sz="1800" kern="1200">
+                <a:solidFill>
+                  <a:schemeClr val="tx1"/>
+                </a:solidFill>
+                <a:latin typeface="+mn-lt"/>
+                <a:ea typeface="+mn-ea"/>
+                <a:cs typeface="+mn-cs"/>
+              </a:defRPr>
+            </a:lvl7pPr>
+            <a:lvl8pPr marL="3429000" indent="-228600" algn="l" defTabSz="914400" rtl="0" eaLnBrk="1" latinLnBrk="0" hangingPunct="1">
+              <a:lnSpc>
+                <a:spcPct val="90000"/>
+              </a:lnSpc>
+              <a:spcBef>
+                <a:spcPts val="500"/>
+              </a:spcBef>
+              <a:buFont typeface="Arial" panose="020B0604020202020204" pitchFamily="34" charset="0"/>
+              <a:buChar char="•"/>
+              <a:defRPr sz="1800" kern="1200">
+                <a:solidFill>
+                  <a:schemeClr val="tx1"/>
+                </a:solidFill>
+                <a:latin typeface="+mn-lt"/>
+                <a:ea typeface="+mn-ea"/>
+                <a:cs typeface="+mn-cs"/>
+              </a:defRPr>
+            </a:lvl8pPr>
+            <a:lvl9pPr marL="3886200" indent="-228600" algn="l" defTabSz="914400" rtl="0" eaLnBrk="1" latinLnBrk="0" hangingPunct="1">
+              <a:lnSpc>
+                <a:spcPct val="90000"/>
+              </a:lnSpc>
+              <a:spcBef>
+                <a:spcPts val="500"/>
+              </a:spcBef>
+              <a:buFont typeface="Arial" panose="020B0604020202020204" pitchFamily="34" charset="0"/>
+              <a:buChar char="•"/>
+              <a:defRPr sz="1800" kern="1200">
+                <a:solidFill>
+                  <a:schemeClr val="tx1"/>
+                </a:solidFill>
+                <a:latin typeface="+mn-lt"/>
+                <a:ea typeface="+mn-ea"/>
+                <a:cs typeface="+mn-cs"/>
+              </a:defRPr>
+            </a:lvl9pPr>
+          </a:lstStyle>
+          <a:p>
+            <a:pPr algn="l"/>
+            <a:r>
+              <a:rPr lang="en-US" i="0" dirty="0" err="1"/>
+              <a:t>Xamarin.Forms</a:t>
+            </a:r>
+            <a:r>
+              <a:rPr lang="en-US" i="0" dirty="0"/>
+              <a:t> with a UWP project runs on these platforms</a:t>
+            </a:r>
+          </a:p>
+        </p:txBody>
+      </p:sp>
+      <p:sp>
+        <p:nvSpPr>
+          <p:cNvPr id="12" name="TextBox 11"/>
+          <p:cNvSpPr txBox="1"/>
+          <p:nvPr/>
+        </p:nvSpPr>
+        <p:spPr>
+          <a:xfrm>
+            <a:off x="847149" y="2737177"/>
+            <a:ext cx="10151855" cy="1569660"/>
+          </a:xfrm>
+          <a:prstGeom prst="rect">
+            <a:avLst/>
+          </a:prstGeom>
+          <a:noFill/>
+        </p:spPr>
+        <p:txBody>
+          <a:bodyPr wrap="square" rtlCol="0">
+            <a:spAutoFit/>
+          </a:bodyPr>
+          <a:lstStyle/>
+          <a:p>
+            <a:pPr marL="342900" indent="-342900">
+              <a:buFont typeface="Wingdings" charset="2"/>
+              <a:buChar char="§"/>
+            </a:pPr>
+            <a:r>
+              <a:rPr lang="en-US" sz="2400" dirty="0"/>
+              <a:t>Windows 10 phones and tablets </a:t>
+            </a:r>
+          </a:p>
+          <a:p>
+            <a:pPr marL="342900" indent="-342900">
+              <a:buFont typeface="Wingdings" charset="2"/>
+              <a:buChar char="§"/>
+            </a:pPr>
+            <a:r>
+              <a:rPr lang="en-US" sz="2400" dirty="0"/>
+              <a:t>Windows 10 PCs</a:t>
+            </a:r>
+          </a:p>
+          <a:p>
+            <a:pPr marL="342900" indent="-342900">
+              <a:buFont typeface="Wingdings" charset="2"/>
+              <a:buChar char="§"/>
+            </a:pPr>
+            <a:r>
+              <a:rPr lang="en-US" sz="2400" dirty="0"/>
+              <a:t>Xbox</a:t>
+            </a:r>
+          </a:p>
+          <a:p>
+            <a:pPr marL="342900" indent="-342900">
+              <a:buFont typeface="Wingdings" charset="2"/>
+              <a:buChar char="§"/>
+            </a:pPr>
+            <a:r>
+              <a:rPr lang="en-US" sz="2400" dirty="0"/>
+              <a:t>HoloLens</a:t>
+            </a:r>
+          </a:p>
+        </p:txBody>
+      </p:sp>
+    </p:spTree>
+    <p:extLst>
+      <p:ext uri="{BB962C8B-B14F-4D97-AF65-F5344CB8AC3E}">
+        <p14:creationId xmlns:p14="http://schemas.microsoft.com/office/powerpoint/2010/main" val="2135232428"/>
+      </p:ext>
+    </p:extLst>
+  </p:cSld>
+  <p:clrMapOvr>
+    <a:masterClrMapping/>
+  </p:clrMapOvr>
+</p:sld>
+</file>
+
+<file path=ppt/slides/slide22.xml><?xml version="1.0" encoding="utf-8"?>
 <p:sld xmlns:a="http://schemas.openxmlformats.org/drawingml/2006/main" xmlns:r="http://schemas.openxmlformats.org/officeDocument/2006/relationships" xmlns:p="http://schemas.openxmlformats.org/presentationml/2006/main">
   <p:cSld>
     <p:spTree>
@@ -15034,10 +15360,10 @@
             <a:p>
               <a:pPr algn="ctr"/>
               <a:r>
-                <a:rPr lang="en-US" sz="2800" dirty="0" err="1" smtClean="0"/>
+                <a:rPr lang="en-US" sz="2800" dirty="0" err="1"/>
                 <a:t>Xamarin</a:t>
               </a:r>
-              <a:endParaRPr lang="en-US" sz="2800" dirty="0" smtClean="0"/>
+              <a:endParaRPr lang="en-US" sz="2800" dirty="0"/>
             </a:p>
             <a:p>
               <a:pPr algn="ctr"/>
@@ -15045,7 +15371,7 @@
             </a:p>
             <a:p>
               <a:pPr algn="ctr"/>
-              <a:endParaRPr lang="en-US" sz="2800" dirty="0" smtClean="0"/>
+              <a:endParaRPr lang="en-US" sz="2800" dirty="0"/>
             </a:p>
             <a:p>
               <a:pPr algn="ctr"/>
@@ -15094,10 +15420,10 @@
             <a:p>
               <a:pPr algn="ctr"/>
               <a:r>
-                <a:rPr lang="en-US" dirty="0" err="1" smtClean="0"/>
+                <a:rPr lang="en-US" dirty="0" err="1"/>
                 <a:t>Xamarin.Forms</a:t>
               </a:r>
-              <a:endParaRPr lang="en-US" dirty="0" smtClean="0"/>
+              <a:endParaRPr lang="en-US" dirty="0"/>
             </a:p>
             <a:p>
               <a:pPr algn="ctr"/>
@@ -15152,7 +15478,7 @@
             <a:p>
               <a:pPr algn="ctr"/>
               <a:r>
-                <a:rPr lang="en-US" dirty="0" err="1" smtClean="0">
+                <a:rPr lang="en-US" dirty="0" err="1">
                   <a:solidFill>
                     <a:srgbClr val="000000"/>
                   </a:solidFill>
@@ -15210,7 +15536,7 @@
             <a:p>
               <a:pPr algn="ctr"/>
               <a:r>
-                <a:rPr lang="en-US" dirty="0" err="1" smtClean="0"/>
+                <a:rPr lang="en-US" dirty="0" err="1"/>
                 <a:t>Xamarin.Android</a:t>
               </a:r>
               <a:endParaRPr lang="en-US" dirty="0"/>
@@ -15258,7 +15584,7 @@
             <a:p>
               <a:pPr algn="ctr"/>
               <a:r>
-                <a:rPr lang="en-US" dirty="0" err="1" smtClean="0">
+                <a:rPr lang="en-US" dirty="0" err="1">
                   <a:solidFill>
                     <a:srgbClr val="000000"/>
                   </a:solidFill>
@@ -15266,7 +15592,7 @@
                 <a:t>iOS</a:t>
               </a:r>
               <a:r>
-                <a:rPr lang="en-US" dirty="0" smtClean="0">
+                <a:rPr lang="en-US" dirty="0">
                   <a:solidFill>
                     <a:srgbClr val="000000"/>
                   </a:solidFill>
@@ -15274,7 +15600,7 @@
                 <a:t> </a:t>
               </a:r>
               <a:r>
-                <a:rPr lang="en-US" dirty="0" err="1" smtClean="0">
+                <a:rPr lang="en-US" dirty="0" err="1">
                   <a:solidFill>
                     <a:srgbClr val="000000"/>
                   </a:solidFill>
@@ -15330,10 +15656,9 @@
             <a:p>
               <a:pPr algn="ctr"/>
               <a:r>
-                <a:rPr lang="en-US" dirty="0" smtClean="0"/>
+                <a:rPr lang="en-US" dirty="0"/>
                 <a:t>Android SDK</a:t>
               </a:r>
-              <a:endParaRPr lang="en-US" dirty="0"/>
             </a:p>
           </p:txBody>
         </p:sp>
@@ -15378,17 +15703,16 @@
             <a:p>
               <a:pPr algn="ctr"/>
               <a:r>
-                <a:rPr lang="en-US" dirty="0" smtClean="0"/>
+                <a:rPr lang="en-US" dirty="0"/>
                 <a:t>Windows</a:t>
               </a:r>
             </a:p>
             <a:p>
               <a:pPr algn="ctr"/>
               <a:r>
-                <a:rPr lang="en-US" dirty="0" smtClean="0"/>
+                <a:rPr lang="en-US" dirty="0"/>
                 <a:t>SDK</a:t>
               </a:r>
-              <a:endParaRPr lang="en-US" dirty="0"/>
             </a:p>
           </p:txBody>
         </p:sp>
@@ -15406,7 +15730,7 @@
 </p:sld>
 </file>
 
-<file path=ppt/slides/slide22.xml><?xml version="1.0" encoding="utf-8"?>
+<file path=ppt/slides/slide23.xml><?xml version="1.0" encoding="utf-8"?>
 <p:sld xmlns:a="http://schemas.openxmlformats.org/drawingml/2006/main" xmlns:r="http://schemas.openxmlformats.org/officeDocument/2006/relationships" xmlns:p="http://schemas.openxmlformats.org/presentationml/2006/main">
   <p:cSld>
     <p:spTree>
@@ -15857,7 +16181,7 @@
 </p:sld>
 </file>
 
-<file path=ppt/slides/slide23.xml><?xml version="1.0" encoding="utf-8"?>
+<file path=ppt/slides/slide24.xml><?xml version="1.0" encoding="utf-8"?>
 <p:sld xmlns:a="http://schemas.openxmlformats.org/drawingml/2006/main" xmlns:r="http://schemas.openxmlformats.org/officeDocument/2006/relationships" xmlns:p="http://schemas.openxmlformats.org/presentationml/2006/main">
   <p:cSld>
     <p:spTree>
@@ -16092,13 +16416,8 @@
             </a:pPr>
             <a:r>
               <a:rPr lang="en-US" sz="2400" dirty="0"/>
-              <a:t>Isolate and minimize platform-specific </a:t>
-            </a:r>
-            <a:r>
-              <a:rPr lang="en-US" sz="2400" dirty="0" smtClean="0"/>
-              <a:t>code</a:t>
-            </a:r>
-            <a:endParaRPr lang="en-US" sz="2400" dirty="0"/>
+              <a:t>Isolate and minimize platform-specific code</a:t>
+            </a:r>
           </a:p>
           <a:p>
             <a:pPr>
@@ -16127,13 +16446,8 @@
             </a:pPr>
             <a:r>
               <a:rPr lang="en-US" dirty="0"/>
-              <a:t>API/UI </a:t>
-            </a:r>
-            <a:r>
-              <a:rPr lang="en-US" dirty="0" smtClean="0"/>
-              <a:t>layers</a:t>
-            </a:r>
-            <a:endParaRPr lang="en-US" dirty="0"/>
+              <a:t>API/UI layers</a:t>
+            </a:r>
           </a:p>
           <a:p>
             <a:pPr>
@@ -16658,7 +16972,7 @@
 </p:sld>
 </file>
 
-<file path=ppt/slides/slide24.xml><?xml version="1.0" encoding="utf-8"?>
+<file path=ppt/slides/slide25.xml><?xml version="1.0" encoding="utf-8"?>
 <p:sld xmlns:a="http://schemas.openxmlformats.org/drawingml/2006/main" xmlns:r="http://schemas.openxmlformats.org/officeDocument/2006/relationships" xmlns:p="http://schemas.openxmlformats.org/presentationml/2006/main">
   <p:cSld>
     <p:spTree>
@@ -17681,14 +17995,14 @@
               </a:ln>
               <a:extLst>
                 <a:ext uri="{909E8E84-426E-40dd-AFC4-6F175D3DCCD1}">
-                  <a14:hiddenFill xmlns:a14="http://schemas.microsoft.com/office/drawing/2010/main" xmlns="">
+                  <a14:hiddenFill xmlns="" xmlns:a14="http://schemas.microsoft.com/office/drawing/2010/main">
                     <a:solidFill>
                       <a:srgbClr val="FFFFFF"/>
                     </a:solidFill>
                   </a14:hiddenFill>
                 </a:ext>
                 <a:ext uri="{91240B29-F687-4f45-9708-019B960494DF}">
-                  <a14:hiddenLine xmlns:a14="http://schemas.microsoft.com/office/drawing/2010/main" xmlns="" w="9525">
+                  <a14:hiddenLine xmlns="" xmlns:a14="http://schemas.microsoft.com/office/drawing/2010/main" w="9525">
                     <a:solidFill>
                       <a:srgbClr val="000000"/>
                     </a:solidFill>
@@ -17722,14 +18036,14 @@
               </a:ln>
               <a:extLst>
                 <a:ext uri="{909E8E84-426E-40dd-AFC4-6F175D3DCCD1}">
-                  <a14:hiddenFill xmlns:a14="http://schemas.microsoft.com/office/drawing/2010/main" xmlns="">
+                  <a14:hiddenFill xmlns="" xmlns:a14="http://schemas.microsoft.com/office/drawing/2010/main">
                     <a:solidFill>
                       <a:srgbClr val="FFFFFF"/>
                     </a:solidFill>
                   </a14:hiddenFill>
                 </a:ext>
                 <a:ext uri="{91240B29-F687-4f45-9708-019B960494DF}">
-                  <a14:hiddenLine xmlns:a14="http://schemas.microsoft.com/office/drawing/2010/main" xmlns="" w="9525">
+                  <a14:hiddenLine xmlns="" xmlns:a14="http://schemas.microsoft.com/office/drawing/2010/main" w="9525">
                     <a:solidFill>
                       <a:srgbClr val="000000"/>
                     </a:solidFill>
@@ -17892,14 +18206,14 @@
             </a:ln>
             <a:extLst>
               <a:ext uri="{909E8E84-426E-40dd-AFC4-6F175D3DCCD1}">
-                <a14:hiddenFill xmlns:a14="http://schemas.microsoft.com/office/drawing/2010/main" xmlns="">
+                <a14:hiddenFill xmlns="" xmlns:a14="http://schemas.microsoft.com/office/drawing/2010/main">
                   <a:solidFill>
                     <a:srgbClr val="FFFFFF"/>
                   </a:solidFill>
                 </a14:hiddenFill>
               </a:ext>
               <a:ext uri="{91240B29-F687-4f45-9708-019B960494DF}">
-                <a14:hiddenLine xmlns:a14="http://schemas.microsoft.com/office/drawing/2010/main" xmlns="" w="9525">
+                <a14:hiddenLine xmlns="" xmlns:a14="http://schemas.microsoft.com/office/drawing/2010/main" w="9525">
                   <a:solidFill>
                     <a:srgbClr val="000000"/>
                   </a:solidFill>
@@ -17980,14 +18294,14 @@
           </a:ln>
           <a:extLst>
             <a:ext uri="{909E8E84-426E-40dd-AFC4-6F175D3DCCD1}">
-              <a14:hiddenFill xmlns:a14="http://schemas.microsoft.com/office/drawing/2010/main" xmlns="">
+              <a14:hiddenFill xmlns="" xmlns:a14="http://schemas.microsoft.com/office/drawing/2010/main">
                 <a:solidFill>
                   <a:srgbClr val="FFFFFF"/>
                 </a:solidFill>
               </a14:hiddenFill>
             </a:ext>
             <a:ext uri="{91240B29-F687-4f45-9708-019B960494DF}">
-              <a14:hiddenLine xmlns:a14="http://schemas.microsoft.com/office/drawing/2010/main" xmlns="" w="9525">
+              <a14:hiddenLine xmlns="" xmlns:a14="http://schemas.microsoft.com/office/drawing/2010/main" w="9525">
                 <a:solidFill>
                   <a:srgbClr val="000000"/>
                 </a:solidFill>
@@ -18141,7 +18455,7 @@
               <a:buChar char="§"/>
             </a:pPr>
             <a:r>
-              <a:rPr lang="en-US" altLang="en-US" sz="2400" dirty="0" err="1" smtClean="0">
+              <a:rPr lang="en-US" altLang="en-US" sz="2400" dirty="0" err="1">
                 <a:solidFill>
                   <a:srgbClr val="000000"/>
                 </a:solidFill>
@@ -18151,42 +18465,15 @@
               <a:t>Xamarin</a:t>
             </a:r>
             <a:r>
-              <a:rPr lang="en-US" altLang="en-US" sz="2400" dirty="0" smtClean="0">
+              <a:rPr lang="en-US" altLang="en-US" sz="2400" dirty="0">
                 <a:solidFill>
                   <a:srgbClr val="000000"/>
                 </a:solidFill>
                 <a:latin typeface="Segoe UI"/>
                 <a:cs typeface="Segoe UI"/>
               </a:rPr>
-              <a:t> </a:t>
-            </a:r>
-            <a:r>
-              <a:rPr lang="en-US" altLang="en-US" sz="2400" dirty="0">
-                <a:solidFill>
-                  <a:srgbClr val="000000"/>
-                </a:solidFill>
-                <a:latin typeface="Segoe UI"/>
-                <a:cs typeface="Segoe UI"/>
-              </a:rPr>
-              <a:t>delivers fully native user interfaces and app </a:t>
-            </a:r>
-            <a:r>
-              <a:rPr lang="en-US" altLang="en-US" sz="2400" dirty="0" smtClean="0">
-                <a:solidFill>
-                  <a:srgbClr val="000000"/>
-                </a:solidFill>
-                <a:latin typeface="Segoe UI"/>
-                <a:cs typeface="Segoe UI"/>
-              </a:rPr>
-              <a:t>functionality</a:t>
-            </a:r>
-            <a:endParaRPr lang="en-US" altLang="en-US" sz="2400" dirty="0">
-              <a:solidFill>
-                <a:srgbClr val="000000"/>
-              </a:solidFill>
-              <a:latin typeface="Segoe UI"/>
-              <a:cs typeface="Segoe UI"/>
-            </a:endParaRPr>
+              <a:t> delivers fully native user interfaces and app functionality</a:t>
+            </a:r>
           </a:p>
           <a:p>
             <a:pPr lvl="1">
@@ -18221,25 +18508,8 @@
                 <a:latin typeface="Segoe UI"/>
                 <a:cs typeface="Segoe UI"/>
               </a:rPr>
-              <a:t>, Android and Windows in C</a:t>
-            </a:r>
-            <a:r>
-              <a:rPr lang="en-US" altLang="en-US" sz="2400" dirty="0" smtClean="0">
-                <a:solidFill>
-                  <a:srgbClr val="000000"/>
-                </a:solidFill>
-                <a:latin typeface="Segoe UI"/>
-                <a:cs typeface="Segoe UI"/>
-              </a:rPr>
-              <a:t>#</a:t>
-            </a:r>
-            <a:endParaRPr lang="en-US" altLang="en-US" sz="2400" dirty="0">
-              <a:solidFill>
-                <a:srgbClr val="000000"/>
-              </a:solidFill>
-              <a:latin typeface="Segoe UI"/>
-              <a:cs typeface="Segoe UI"/>
-            </a:endParaRPr>
+              <a:t>, Android and Windows in C#</a:t>
+            </a:r>
           </a:p>
           <a:p>
             <a:pPr lvl="1">
@@ -18254,25 +18524,8 @@
                 <a:latin typeface="Segoe UI"/>
                 <a:cs typeface="Segoe UI"/>
               </a:rPr>
-              <a:t>Share app logic and UI code across device </a:t>
-            </a:r>
-            <a:r>
-              <a:rPr lang="en-US" altLang="en-US" sz="2400" dirty="0" smtClean="0">
-                <a:solidFill>
-                  <a:srgbClr val="000000"/>
-                </a:solidFill>
-                <a:latin typeface="Segoe UI"/>
-                <a:cs typeface="Segoe UI"/>
-              </a:rPr>
-              <a:t>platforms</a:t>
-            </a:r>
-            <a:endParaRPr lang="en-US" altLang="en-US" sz="2400" dirty="0">
-              <a:solidFill>
-                <a:srgbClr val="000000"/>
-              </a:solidFill>
-              <a:latin typeface="Segoe UI"/>
-              <a:cs typeface="Segoe UI"/>
-            </a:endParaRPr>
+              <a:t>Share app logic and UI code across device platforms</a:t>
+            </a:r>
           </a:p>
         </p:txBody>
       </p:sp>
@@ -20011,14 +20264,14 @@
                 <a:gridCol w="4786355">
                   <a:extLst>
                     <a:ext uri="{9D8B030D-6E8A-4147-A177-3AD203B41FA5}">
-                      <a16:colId xmlns="" xmlns:a16="http://schemas.microsoft.com/office/drawing/2014/main" val="48614039"/>
+                      <a16:colId xmlns:a16="http://schemas.microsoft.com/office/drawing/2014/main" xmlns="" val="48614039"/>
                     </a:ext>
                   </a:extLst>
                 </a:gridCol>
                 <a:gridCol w="5662501">
                   <a:extLst>
                     <a:ext uri="{9D8B030D-6E8A-4147-A177-3AD203B41FA5}">
-                      <a16:colId xmlns="" xmlns:a16="http://schemas.microsoft.com/office/drawing/2014/main" val="1124546490"/>
+                      <a16:colId xmlns:a16="http://schemas.microsoft.com/office/drawing/2014/main" xmlns="" val="1124546490"/>
                     </a:ext>
                   </a:extLst>
                 </a:gridCol>
@@ -20070,7 +20323,7 @@
                 </a:tc>
                 <a:extLst>
                   <a:ext uri="{0D108BD9-81ED-4DB2-BD59-A6C34878D82A}">
-                    <a16:rowId xmlns="" xmlns:a16="http://schemas.microsoft.com/office/drawing/2014/main" val="679667022"/>
+                    <a16:rowId xmlns:a16="http://schemas.microsoft.com/office/drawing/2014/main" xmlns="" val="679667022"/>
                   </a:ext>
                 </a:extLst>
               </a:tr>
@@ -20106,13 +20359,8 @@
                       </a:br>
                       <a:r>
                         <a:rPr lang="en-US" b="1" dirty="0"/>
-                        <a:t>founded Mono </a:t>
+                        <a:t>founded Mono project </a:t>
                       </a:r>
-                      <a:r>
-                        <a:rPr lang="en-US" b="1" dirty="0" smtClean="0"/>
-                        <a:t>project </a:t>
-                      </a:r>
-                      <a:endParaRPr lang="en-US" b="1" dirty="0"/>
                     </a:p>
                   </a:txBody>
                   <a:tcPr anchor="ctr">
@@ -20145,7 +20393,7 @@
                 </a:tc>
                 <a:extLst>
                   <a:ext uri="{0D108BD9-81ED-4DB2-BD59-A6C34878D82A}">
-                    <a16:rowId xmlns="" xmlns:a16="http://schemas.microsoft.com/office/drawing/2014/main" val="2034482246"/>
+                    <a16:rowId xmlns:a16="http://schemas.microsoft.com/office/drawing/2014/main" xmlns="" val="2034482246"/>
                   </a:ext>
                 </a:extLst>
               </a:tr>
@@ -20158,13 +20406,8 @@
                       <a:pPr algn="ctr"/>
                       <a:r>
                         <a:rPr lang="en-US" b="1" dirty="0"/>
-                        <a:t>Follows the ECMA standard for C</a:t>
+                        <a:t>Follows the ECMA standard for C#</a:t>
                       </a:r>
-                      <a:r>
-                        <a:rPr lang="en-US" b="1" dirty="0" smtClean="0"/>
-                        <a:t>#</a:t>
-                      </a:r>
-                      <a:endParaRPr lang="en-US" b="1" dirty="0"/>
                     </a:p>
                   </a:txBody>
                   <a:tcPr anchor="ctr">
@@ -20213,7 +20456,7 @@
                 </a:tc>
                 <a:extLst>
                   <a:ext uri="{0D108BD9-81ED-4DB2-BD59-A6C34878D82A}">
-                    <a16:rowId xmlns="" xmlns:a16="http://schemas.microsoft.com/office/drawing/2014/main" val="682465758"/>
+                    <a16:rowId xmlns:a16="http://schemas.microsoft.com/office/drawing/2014/main" xmlns="" val="682465758"/>
                   </a:ext>
                 </a:extLst>
               </a:tr>
@@ -20272,7 +20515,7 @@
                 </a:tc>
                 <a:extLst>
                   <a:ext uri="{0D108BD9-81ED-4DB2-BD59-A6C34878D82A}">
-                    <a16:rowId xmlns="" xmlns:a16="http://schemas.microsoft.com/office/drawing/2014/main" val="4230228483"/>
+                    <a16:rowId xmlns:a16="http://schemas.microsoft.com/office/drawing/2014/main" xmlns="" val="4230228483"/>
                   </a:ext>
                 </a:extLst>
               </a:tr>
@@ -20323,7 +20566,7 @@
                 </a:tc>
                 <a:extLst>
                   <a:ext uri="{0D108BD9-81ED-4DB2-BD59-A6C34878D82A}">
-                    <a16:rowId xmlns="" xmlns:a16="http://schemas.microsoft.com/office/drawing/2014/main" val="10004"/>
+                    <a16:rowId xmlns:a16="http://schemas.microsoft.com/office/drawing/2014/main" xmlns="" val="10004"/>
                   </a:ext>
                 </a:extLst>
               </a:tr>
@@ -20417,7 +20660,7 @@
                 <a:gridCol w="10446296">
                   <a:extLst>
                     <a:ext uri="{9D8B030D-6E8A-4147-A177-3AD203B41FA5}">
-                      <a16:colId xmlns="" xmlns:a16="http://schemas.microsoft.com/office/drawing/2014/main" val="48614039"/>
+                      <a16:colId xmlns:a16="http://schemas.microsoft.com/office/drawing/2014/main" xmlns="" val="48614039"/>
                     </a:ext>
                   </a:extLst>
                 </a:gridCol>
@@ -20447,7 +20690,7 @@
                 </a:tc>
                 <a:extLst>
                   <a:ext uri="{0D108BD9-81ED-4DB2-BD59-A6C34878D82A}">
-                    <a16:rowId xmlns="" xmlns:a16="http://schemas.microsoft.com/office/drawing/2014/main" val="679667022"/>
+                    <a16:rowId xmlns:a16="http://schemas.microsoft.com/office/drawing/2014/main" xmlns="" val="679667022"/>
                   </a:ext>
                 </a:extLst>
               </a:tr>
@@ -20494,7 +20737,7 @@
                 </a:tc>
                 <a:extLst>
                   <a:ext uri="{0D108BD9-81ED-4DB2-BD59-A6C34878D82A}">
-                    <a16:rowId xmlns="" xmlns:a16="http://schemas.microsoft.com/office/drawing/2014/main" val="2034482246"/>
+                    <a16:rowId xmlns:a16="http://schemas.microsoft.com/office/drawing/2014/main" xmlns="" val="2034482246"/>
                   </a:ext>
                 </a:extLst>
               </a:tr>
@@ -20521,7 +20764,7 @@
                 </a:tc>
                 <a:extLst>
                   <a:ext uri="{0D108BD9-81ED-4DB2-BD59-A6C34878D82A}">
-                    <a16:rowId xmlns="" xmlns:a16="http://schemas.microsoft.com/office/drawing/2014/main" val="682465758"/>
+                    <a16:rowId xmlns:a16="http://schemas.microsoft.com/office/drawing/2014/main" xmlns="" val="682465758"/>
                   </a:ext>
                 </a:extLst>
               </a:tr>
@@ -20550,13 +20793,8 @@
                       </a:r>
                       <a:r>
                         <a:rPr lang="en-US" dirty="0"/>
-                        <a:t> to continue/expand Mono </a:t>
+                        <a:t> to continue/expand Mono project (2011)</a:t>
                       </a:r>
-                      <a:r>
-                        <a:rPr lang="en-US" dirty="0" smtClean="0"/>
-                        <a:t>project (2011)</a:t>
-                      </a:r>
-                      <a:endParaRPr lang="en-US" dirty="0"/>
                     </a:p>
                   </a:txBody>
                   <a:tcPr anchor="ctr">
@@ -20569,7 +20807,7 @@
                 </a:tc>
                 <a:extLst>
                   <a:ext uri="{0D108BD9-81ED-4DB2-BD59-A6C34878D82A}">
-                    <a16:rowId xmlns="" xmlns:a16="http://schemas.microsoft.com/office/drawing/2014/main" val="4230228483"/>
+                    <a16:rowId xmlns:a16="http://schemas.microsoft.com/office/drawing/2014/main" xmlns="" val="4230228483"/>
                   </a:ext>
                 </a:extLst>
               </a:tr>
@@ -20668,14 +20906,14 @@
                 <a:gridCol w="3706437">
                   <a:extLst>
                     <a:ext uri="{9D8B030D-6E8A-4147-A177-3AD203B41FA5}">
-                      <a16:colId xmlns="" xmlns:a16="http://schemas.microsoft.com/office/drawing/2014/main" val="48614039"/>
+                      <a16:colId xmlns:a16="http://schemas.microsoft.com/office/drawing/2014/main" xmlns="" val="48614039"/>
                     </a:ext>
                   </a:extLst>
                 </a:gridCol>
                 <a:gridCol w="6742419">
                   <a:extLst>
                     <a:ext uri="{9D8B030D-6E8A-4147-A177-3AD203B41FA5}">
-                      <a16:colId xmlns="" xmlns:a16="http://schemas.microsoft.com/office/drawing/2014/main" val="1124546490"/>
+                      <a16:colId xmlns:a16="http://schemas.microsoft.com/office/drawing/2014/main" xmlns="" val="1124546490"/>
                     </a:ext>
                   </a:extLst>
                 </a:gridCol>
@@ -20688,7 +20926,7 @@
                     <a:p>
                       <a:pPr algn="ctr"/>
                       <a:r>
-                        <a:rPr lang="en-US" b="1" smtClean="0">
+                        <a:rPr lang="en-US" b="1">
                           <a:solidFill>
                             <a:schemeClr val="bg1"/>
                           </a:solidFill>
@@ -20732,7 +20970,7 @@
                 </a:tc>
                 <a:extLst>
                   <a:ext uri="{0D108BD9-81ED-4DB2-BD59-A6C34878D82A}">
-                    <a16:rowId xmlns="" xmlns:a16="http://schemas.microsoft.com/office/drawing/2014/main" val="679667022"/>
+                    <a16:rowId xmlns:a16="http://schemas.microsoft.com/office/drawing/2014/main" xmlns="" val="679667022"/>
                   </a:ext>
                 </a:extLst>
               </a:tr>
@@ -20760,7 +20998,7 @@
                         <a:defRPr/>
                       </a:pPr>
                       <a:r>
-                        <a:rPr lang="en-US" b="1" smtClean="0"/>
+                        <a:rPr lang="en-US" b="1"/>
                         <a:t>Xamarin.Mac (2012)</a:t>
                       </a:r>
                       <a:endParaRPr lang="en-US" b="1" dirty="0"/>
@@ -20796,7 +21034,7 @@
                 </a:tc>
                 <a:extLst>
                   <a:ext uri="{0D108BD9-81ED-4DB2-BD59-A6C34878D82A}">
-                    <a16:rowId xmlns="" xmlns:a16="http://schemas.microsoft.com/office/drawing/2014/main" val="2034482246"/>
+                    <a16:rowId xmlns:a16="http://schemas.microsoft.com/office/drawing/2014/main" xmlns="" val="2034482246"/>
                   </a:ext>
                 </a:extLst>
               </a:tr>
@@ -20824,7 +21062,7 @@
                         <a:defRPr/>
                       </a:pPr>
                       <a:r>
-                        <a:rPr lang="en-US" b="1" smtClean="0"/>
+                        <a:rPr lang="en-US" b="1"/>
                         <a:t>Xamarin 2.0 Announced (2013)</a:t>
                       </a:r>
                       <a:endParaRPr lang="en-US" b="1" dirty="0"/>
@@ -20963,7 +21201,7 @@
                 </a:tc>
                 <a:extLst>
                   <a:ext uri="{0D108BD9-81ED-4DB2-BD59-A6C34878D82A}">
-                    <a16:rowId xmlns="" xmlns:a16="http://schemas.microsoft.com/office/drawing/2014/main" val="682465758"/>
+                    <a16:rowId xmlns:a16="http://schemas.microsoft.com/office/drawing/2014/main" xmlns="" val="682465758"/>
                   </a:ext>
                 </a:extLst>
               </a:tr>
@@ -20991,21 +21229,20 @@
                         <a:defRPr/>
                       </a:pPr>
                       <a:r>
-                        <a:rPr lang="en-US" b="1" dirty="0" err="1" smtClean="0"/>
+                        <a:rPr lang="en-US" b="1" dirty="0" err="1"/>
                         <a:t>Xamarin</a:t>
                       </a:r>
                       <a:r>
-                        <a:rPr lang="en-US" b="1" dirty="0" smtClean="0"/>
+                        <a:rPr lang="en-US" b="1" dirty="0"/>
                         <a:t> Acquired </a:t>
                       </a:r>
                       <a:br>
-                        <a:rPr lang="en-US" b="1" dirty="0" smtClean="0"/>
+                        <a:rPr lang="en-US" b="1" dirty="0"/>
                       </a:br>
                       <a:r>
-                        <a:rPr lang="en-US" b="1" dirty="0" smtClean="0"/>
+                        <a:rPr lang="en-US" b="1" dirty="0"/>
                         <a:t>by Microsoft (2016)</a:t>
                       </a:r>
-                      <a:endParaRPr lang="en-US" b="1" dirty="0"/>
                     </a:p>
                   </a:txBody>
                   <a:tcPr anchor="ctr">
@@ -21049,7 +21286,7 @@
                 </a:tc>
                 <a:extLst>
                   <a:ext uri="{0D108BD9-81ED-4DB2-BD59-A6C34878D82A}">
-                    <a16:rowId xmlns="" xmlns:a16="http://schemas.microsoft.com/office/drawing/2014/main" val="4230228483"/>
+                    <a16:rowId xmlns:a16="http://schemas.microsoft.com/office/drawing/2014/main" xmlns="" val="4230228483"/>
                   </a:ext>
                 </a:extLst>
               </a:tr>

</xml_diff>